<commit_message>
add np6 and ppt numpy2 changed np6
</commit_message>
<xml_diff>
--- a/02 NUMPY 2.pptx
+++ b/02 NUMPY 2.pptx
@@ -4,6 +4,9 @@
   <p:sldMasterIdLst>
     <p:sldMasterId id="2147483852" r:id="rId1"/>
   </p:sldMasterIdLst>
+  <p:notesMasterIdLst>
+    <p:notesMasterId r:id="rId21"/>
+  </p:notesMasterIdLst>
   <p:sldIdLst>
     <p:sldId id="256" r:id="rId2"/>
     <p:sldId id="257" r:id="rId3"/>
@@ -141,6 +144,355 @@
 </p:presentation>
 </file>
 
+<file path=ppt/notesMasters/notesMaster1.xml><?xml version="1.0" encoding="utf-8"?>
+<p:notesMaster xmlns:a="http://schemas.openxmlformats.org/drawingml/2006/main" xmlns:r="http://schemas.openxmlformats.org/officeDocument/2006/relationships" xmlns:p="http://schemas.openxmlformats.org/presentationml/2006/main">
+  <p:cSld>
+    <p:bg>
+      <p:bgRef idx="1001">
+        <a:schemeClr val="bg1"/>
+      </p:bgRef>
+    </p:bg>
+    <p:spTree>
+      <p:nvGrpSpPr>
+        <p:cNvPr id="1" name=""/>
+        <p:cNvGrpSpPr/>
+        <p:nvPr/>
+      </p:nvGrpSpPr>
+      <p:grpSpPr>
+        <a:xfrm>
+          <a:off x="0" y="0"/>
+          <a:ext cx="0" cy="0"/>
+          <a:chOff x="0" y="0"/>
+          <a:chExt cx="0" cy="0"/>
+        </a:xfrm>
+      </p:grpSpPr>
+      <p:sp>
+        <p:nvSpPr>
+          <p:cNvPr id="2" name="Верхний колонтитул 1"/>
+          <p:cNvSpPr>
+            <a:spLocks noGrp="1"/>
+          </p:cNvSpPr>
+          <p:nvPr>
+            <p:ph type="hdr" sz="quarter"/>
+          </p:nvPr>
+        </p:nvSpPr>
+        <p:spPr>
+          <a:xfrm>
+            <a:off x="0" y="0"/>
+            <a:ext cx="2971800" cy="458788"/>
+          </a:xfrm>
+          <a:prstGeom prst="rect">
+            <a:avLst/>
+          </a:prstGeom>
+        </p:spPr>
+        <p:txBody>
+          <a:bodyPr vert="horz" lIns="91440" tIns="45720" rIns="91440" bIns="45720" rtlCol="0"/>
+          <a:lstStyle>
+            <a:lvl1pPr algn="l">
+              <a:defRPr sz="1200"/>
+            </a:lvl1pPr>
+          </a:lstStyle>
+          <a:p>
+            <a:endParaRPr lang="ru-RU"/>
+          </a:p>
+        </p:txBody>
+      </p:sp>
+      <p:sp>
+        <p:nvSpPr>
+          <p:cNvPr id="3" name="Дата 2"/>
+          <p:cNvSpPr>
+            <a:spLocks noGrp="1"/>
+          </p:cNvSpPr>
+          <p:nvPr>
+            <p:ph type="dt" idx="1"/>
+          </p:nvPr>
+        </p:nvSpPr>
+        <p:spPr>
+          <a:xfrm>
+            <a:off x="3884613" y="0"/>
+            <a:ext cx="2971800" cy="458788"/>
+          </a:xfrm>
+          <a:prstGeom prst="rect">
+            <a:avLst/>
+          </a:prstGeom>
+        </p:spPr>
+        <p:txBody>
+          <a:bodyPr vert="horz" lIns="91440" tIns="45720" rIns="91440" bIns="45720" rtlCol="0"/>
+          <a:lstStyle>
+            <a:lvl1pPr algn="r">
+              <a:defRPr sz="1200"/>
+            </a:lvl1pPr>
+          </a:lstStyle>
+          <a:p>
+            <a:fld id="{5F7BEC9E-3FFB-4D35-B6F5-4EE814FE9D22}" type="datetimeFigureOut">
+              <a:rPr lang="ru-RU" smtClean="0"/>
+              <a:t>11.11.2019</a:t>
+            </a:fld>
+            <a:endParaRPr lang="ru-RU"/>
+          </a:p>
+        </p:txBody>
+      </p:sp>
+      <p:sp>
+        <p:nvSpPr>
+          <p:cNvPr id="4" name="Образ слайда 3"/>
+          <p:cNvSpPr>
+            <a:spLocks noGrp="1" noRot="1" noChangeAspect="1"/>
+          </p:cNvSpPr>
+          <p:nvPr>
+            <p:ph type="sldImg" idx="2"/>
+          </p:nvPr>
+        </p:nvSpPr>
+        <p:spPr>
+          <a:xfrm>
+            <a:off x="685800" y="1143000"/>
+            <a:ext cx="5486400" cy="3086100"/>
+          </a:xfrm>
+          <a:prstGeom prst="rect">
+            <a:avLst/>
+          </a:prstGeom>
+          <a:noFill/>
+          <a:ln w="12700">
+            <a:solidFill>
+              <a:prstClr val="black"/>
+            </a:solidFill>
+          </a:ln>
+        </p:spPr>
+        <p:txBody>
+          <a:bodyPr vert="horz" lIns="91440" tIns="45720" rIns="91440" bIns="45720" rtlCol="0" anchor="ctr"/>
+          <a:lstStyle/>
+          <a:p>
+            <a:endParaRPr lang="ru-RU"/>
+          </a:p>
+        </p:txBody>
+      </p:sp>
+      <p:sp>
+        <p:nvSpPr>
+          <p:cNvPr id="5" name="Заметки 4"/>
+          <p:cNvSpPr>
+            <a:spLocks noGrp="1"/>
+          </p:cNvSpPr>
+          <p:nvPr>
+            <p:ph type="body" sz="quarter" idx="3"/>
+          </p:nvPr>
+        </p:nvSpPr>
+        <p:spPr>
+          <a:xfrm>
+            <a:off x="685800" y="4400550"/>
+            <a:ext cx="5486400" cy="3600450"/>
+          </a:xfrm>
+          <a:prstGeom prst="rect">
+            <a:avLst/>
+          </a:prstGeom>
+        </p:spPr>
+        <p:txBody>
+          <a:bodyPr vert="horz" lIns="91440" tIns="45720" rIns="91440" bIns="45720" rtlCol="0"/>
+          <a:lstStyle/>
+          <a:p>
+            <a:pPr lvl="0"/>
+            <a:r>
+              <a:rPr lang="ru-RU"/>
+              <a:t>Образец текста</a:t>
+            </a:r>
+          </a:p>
+          <a:p>
+            <a:pPr lvl="1"/>
+            <a:r>
+              <a:rPr lang="ru-RU"/>
+              <a:t>Второй уровень</a:t>
+            </a:r>
+          </a:p>
+          <a:p>
+            <a:pPr lvl="2"/>
+            <a:r>
+              <a:rPr lang="ru-RU"/>
+              <a:t>Третий уровень</a:t>
+            </a:r>
+          </a:p>
+          <a:p>
+            <a:pPr lvl="3"/>
+            <a:r>
+              <a:rPr lang="ru-RU"/>
+              <a:t>Четвертый уровень</a:t>
+            </a:r>
+          </a:p>
+          <a:p>
+            <a:pPr lvl="4"/>
+            <a:r>
+              <a:rPr lang="ru-RU"/>
+              <a:t>Пятый уровень</a:t>
+            </a:r>
+          </a:p>
+        </p:txBody>
+      </p:sp>
+      <p:sp>
+        <p:nvSpPr>
+          <p:cNvPr id="6" name="Нижний колонтитул 5"/>
+          <p:cNvSpPr>
+            <a:spLocks noGrp="1"/>
+          </p:cNvSpPr>
+          <p:nvPr>
+            <p:ph type="ftr" sz="quarter" idx="4"/>
+          </p:nvPr>
+        </p:nvSpPr>
+        <p:spPr>
+          <a:xfrm>
+            <a:off x="0" y="8685213"/>
+            <a:ext cx="2971800" cy="458787"/>
+          </a:xfrm>
+          <a:prstGeom prst="rect">
+            <a:avLst/>
+          </a:prstGeom>
+        </p:spPr>
+        <p:txBody>
+          <a:bodyPr vert="horz" lIns="91440" tIns="45720" rIns="91440" bIns="45720" rtlCol="0" anchor="b"/>
+          <a:lstStyle>
+            <a:lvl1pPr algn="l">
+              <a:defRPr sz="1200"/>
+            </a:lvl1pPr>
+          </a:lstStyle>
+          <a:p>
+            <a:endParaRPr lang="ru-RU"/>
+          </a:p>
+        </p:txBody>
+      </p:sp>
+      <p:sp>
+        <p:nvSpPr>
+          <p:cNvPr id="7" name="Номер слайда 6"/>
+          <p:cNvSpPr>
+            <a:spLocks noGrp="1"/>
+          </p:cNvSpPr>
+          <p:nvPr>
+            <p:ph type="sldNum" sz="quarter" idx="5"/>
+          </p:nvPr>
+        </p:nvSpPr>
+        <p:spPr>
+          <a:xfrm>
+            <a:off x="3884613" y="8685213"/>
+            <a:ext cx="2971800" cy="458787"/>
+          </a:xfrm>
+          <a:prstGeom prst="rect">
+            <a:avLst/>
+          </a:prstGeom>
+        </p:spPr>
+        <p:txBody>
+          <a:bodyPr vert="horz" lIns="91440" tIns="45720" rIns="91440" bIns="45720" rtlCol="0" anchor="b"/>
+          <a:lstStyle>
+            <a:lvl1pPr algn="r">
+              <a:defRPr sz="1200"/>
+            </a:lvl1pPr>
+          </a:lstStyle>
+          <a:p>
+            <a:fld id="{C61E2E35-344E-473D-B503-5E23E130117E}" type="slidenum">
+              <a:rPr lang="ru-RU" smtClean="0"/>
+              <a:t>‹#›</a:t>
+            </a:fld>
+            <a:endParaRPr lang="ru-RU"/>
+          </a:p>
+        </p:txBody>
+      </p:sp>
+    </p:spTree>
+    <p:extLst>
+      <p:ext uri="{BB962C8B-B14F-4D97-AF65-F5344CB8AC3E}">
+        <p14:creationId xmlns:p14="http://schemas.microsoft.com/office/powerpoint/2010/main" val="1225000622"/>
+      </p:ext>
+    </p:extLst>
+  </p:cSld>
+  <p:clrMap bg1="lt1" tx1="dk1" bg2="lt2" tx2="dk2" accent1="accent1" accent2="accent2" accent3="accent3" accent4="accent4" accent5="accent5" accent6="accent6" hlink="hlink" folHlink="folHlink"/>
+  <p:notesStyle>
+    <a:lvl1pPr marL="0" algn="l" defTabSz="914400" rtl="0" eaLnBrk="1" latinLnBrk="0" hangingPunct="1">
+      <a:defRPr sz="1200" kern="1200">
+        <a:solidFill>
+          <a:schemeClr val="tx1"/>
+        </a:solidFill>
+        <a:latin typeface="+mn-lt"/>
+        <a:ea typeface="+mn-ea"/>
+        <a:cs typeface="+mn-cs"/>
+      </a:defRPr>
+    </a:lvl1pPr>
+    <a:lvl2pPr marL="457200" algn="l" defTabSz="914400" rtl="0" eaLnBrk="1" latinLnBrk="0" hangingPunct="1">
+      <a:defRPr sz="1200" kern="1200">
+        <a:solidFill>
+          <a:schemeClr val="tx1"/>
+        </a:solidFill>
+        <a:latin typeface="+mn-lt"/>
+        <a:ea typeface="+mn-ea"/>
+        <a:cs typeface="+mn-cs"/>
+      </a:defRPr>
+    </a:lvl2pPr>
+    <a:lvl3pPr marL="914400" algn="l" defTabSz="914400" rtl="0" eaLnBrk="1" latinLnBrk="0" hangingPunct="1">
+      <a:defRPr sz="1200" kern="1200">
+        <a:solidFill>
+          <a:schemeClr val="tx1"/>
+        </a:solidFill>
+        <a:latin typeface="+mn-lt"/>
+        <a:ea typeface="+mn-ea"/>
+        <a:cs typeface="+mn-cs"/>
+      </a:defRPr>
+    </a:lvl3pPr>
+    <a:lvl4pPr marL="1371600" algn="l" defTabSz="914400" rtl="0" eaLnBrk="1" latinLnBrk="0" hangingPunct="1">
+      <a:defRPr sz="1200" kern="1200">
+        <a:solidFill>
+          <a:schemeClr val="tx1"/>
+        </a:solidFill>
+        <a:latin typeface="+mn-lt"/>
+        <a:ea typeface="+mn-ea"/>
+        <a:cs typeface="+mn-cs"/>
+      </a:defRPr>
+    </a:lvl4pPr>
+    <a:lvl5pPr marL="1828800" algn="l" defTabSz="914400" rtl="0" eaLnBrk="1" latinLnBrk="0" hangingPunct="1">
+      <a:defRPr sz="1200" kern="1200">
+        <a:solidFill>
+          <a:schemeClr val="tx1"/>
+        </a:solidFill>
+        <a:latin typeface="+mn-lt"/>
+        <a:ea typeface="+mn-ea"/>
+        <a:cs typeface="+mn-cs"/>
+      </a:defRPr>
+    </a:lvl5pPr>
+    <a:lvl6pPr marL="2286000" algn="l" defTabSz="914400" rtl="0" eaLnBrk="1" latinLnBrk="0" hangingPunct="1">
+      <a:defRPr sz="1200" kern="1200">
+        <a:solidFill>
+          <a:schemeClr val="tx1"/>
+        </a:solidFill>
+        <a:latin typeface="+mn-lt"/>
+        <a:ea typeface="+mn-ea"/>
+        <a:cs typeface="+mn-cs"/>
+      </a:defRPr>
+    </a:lvl6pPr>
+    <a:lvl7pPr marL="2743200" algn="l" defTabSz="914400" rtl="0" eaLnBrk="1" latinLnBrk="0" hangingPunct="1">
+      <a:defRPr sz="1200" kern="1200">
+        <a:solidFill>
+          <a:schemeClr val="tx1"/>
+        </a:solidFill>
+        <a:latin typeface="+mn-lt"/>
+        <a:ea typeface="+mn-ea"/>
+        <a:cs typeface="+mn-cs"/>
+      </a:defRPr>
+    </a:lvl7pPr>
+    <a:lvl8pPr marL="3200400" algn="l" defTabSz="914400" rtl="0" eaLnBrk="1" latinLnBrk="0" hangingPunct="1">
+      <a:defRPr sz="1200" kern="1200">
+        <a:solidFill>
+          <a:schemeClr val="tx1"/>
+        </a:solidFill>
+        <a:latin typeface="+mn-lt"/>
+        <a:ea typeface="+mn-ea"/>
+        <a:cs typeface="+mn-cs"/>
+      </a:defRPr>
+    </a:lvl8pPr>
+    <a:lvl9pPr marL="3657600" algn="l" defTabSz="914400" rtl="0" eaLnBrk="1" latinLnBrk="0" hangingPunct="1">
+      <a:defRPr sz="1200" kern="1200">
+        <a:solidFill>
+          <a:schemeClr val="tx1"/>
+        </a:solidFill>
+        <a:latin typeface="+mn-lt"/>
+        <a:ea typeface="+mn-ea"/>
+        <a:cs typeface="+mn-cs"/>
+      </a:defRPr>
+    </a:lvl9pPr>
+  </p:notesStyle>
+</p:notesMaster>
+</file>
+
 <file path=ppt/slideLayouts/slideLayout1.xml><?xml version="1.0" encoding="utf-8"?>
 <p:sldLayout xmlns:a="http://schemas.openxmlformats.org/drawingml/2006/main" xmlns:r="http://schemas.openxmlformats.org/officeDocument/2006/relationships" xmlns:p="http://schemas.openxmlformats.org/presentationml/2006/main" showMasterSp="0" type="title" preserve="1">
   <p:cSld name="Титульный слайд">
@@ -363,10 +715,9 @@
           <a:bodyPr/>
           <a:lstStyle/>
           <a:p>
-            <a:fld id="{5586B75A-687E-405C-8A0B-8D00578BA2C3}" type="datetimeFigureOut">
-              <a:rPr lang="en-US" dirty="0"/>
-              <a:pPr/>
-              <a:t>11/10/2019</a:t>
+            <a:fld id="{68B43250-E171-4F27-A220-4A21B05284E2}" type="datetime1">
+              <a:rPr lang="en-US" smtClean="0"/>
+              <a:t>11/11/2019</a:t>
             </a:fld>
             <a:endParaRPr lang="en-US" dirty="0"/>
           </a:p>
@@ -535,10 +886,9 @@
           <a:bodyPr/>
           <a:lstStyle/>
           <a:p>
-            <a:fld id="{5586B75A-687E-405C-8A0B-8D00578BA2C3}" type="datetimeFigureOut">
-              <a:rPr lang="en-US" dirty="0"/>
-              <a:pPr/>
-              <a:t>11/10/2019</a:t>
+            <a:fld id="{9B62C86F-B128-4E7E-A6CB-8B9E061CA36D}" type="datetime1">
+              <a:rPr lang="en-US" smtClean="0"/>
+              <a:t>11/11/2019</a:t>
             </a:fld>
             <a:endParaRPr lang="en-US" dirty="0"/>
           </a:p>
@@ -717,10 +1067,9 @@
           <a:bodyPr/>
           <a:lstStyle/>
           <a:p>
-            <a:fld id="{5586B75A-687E-405C-8A0B-8D00578BA2C3}" type="datetimeFigureOut">
-              <a:rPr lang="en-US" dirty="0"/>
-              <a:pPr/>
-              <a:t>11/10/2019</a:t>
+            <a:fld id="{7763122E-3DE7-449D-9D0E-C99BF8860546}" type="datetime1">
+              <a:rPr lang="en-US" smtClean="0"/>
+              <a:t>11/11/2019</a:t>
             </a:fld>
             <a:endParaRPr lang="en-US" dirty="0"/>
           </a:p>
@@ -889,10 +1238,9 @@
           <a:bodyPr/>
           <a:lstStyle/>
           <a:p>
-            <a:fld id="{5586B75A-687E-405C-8A0B-8D00578BA2C3}" type="datetimeFigureOut">
-              <a:rPr lang="en-US" dirty="0"/>
-              <a:pPr/>
-              <a:t>11/10/2019</a:t>
+            <a:fld id="{812906CB-909A-474C-987B-4B0C22244BFB}" type="datetime1">
+              <a:rPr lang="en-US" smtClean="0"/>
+              <a:t>11/11/2019</a:t>
             </a:fld>
             <a:endParaRPr lang="en-US" dirty="0"/>
           </a:p>
@@ -1149,10 +1497,9 @@
           <a:bodyPr/>
           <a:lstStyle/>
           <a:p>
-            <a:fld id="{5586B75A-687E-405C-8A0B-8D00578BA2C3}" type="datetimeFigureOut">
-              <a:rPr lang="en-US" dirty="0"/>
-              <a:pPr/>
-              <a:t>11/10/2019</a:t>
+            <a:fld id="{EE9B6497-86BA-4A2E-9F36-22357EE374EA}" type="datetime1">
+              <a:rPr lang="en-US" smtClean="0"/>
+              <a:t>11/11/2019</a:t>
             </a:fld>
             <a:endParaRPr lang="en-US" dirty="0"/>
           </a:p>
@@ -1439,10 +1786,9 @@
           <a:bodyPr/>
           <a:lstStyle/>
           <a:p>
-            <a:fld id="{5586B75A-687E-405C-8A0B-8D00578BA2C3}" type="datetimeFigureOut">
-              <a:rPr lang="en-US" dirty="0"/>
-              <a:pPr/>
-              <a:t>11/10/2019</a:t>
+            <a:fld id="{FCDAC2B8-9E5F-49B3-AFCB-BF7939766EE2}" type="datetime1">
+              <a:rPr lang="en-US" smtClean="0"/>
+              <a:t>11/11/2019</a:t>
             </a:fld>
             <a:endParaRPr lang="en-US" dirty="0"/>
           </a:p>
@@ -1883,10 +2229,9 @@
           <a:bodyPr/>
           <a:lstStyle/>
           <a:p>
-            <a:fld id="{5586B75A-687E-405C-8A0B-8D00578BA2C3}" type="datetimeFigureOut">
-              <a:rPr lang="en-US" dirty="0"/>
-              <a:pPr/>
-              <a:t>11/10/2019</a:t>
+            <a:fld id="{6BDDE732-B1CF-4BD6-9169-D8BBD5B4E29A}" type="datetime1">
+              <a:rPr lang="en-US" smtClean="0"/>
+              <a:t>11/11/2019</a:t>
             </a:fld>
             <a:endParaRPr lang="en-US" dirty="0"/>
           </a:p>
@@ -2003,10 +2348,9 @@
           <a:bodyPr/>
           <a:lstStyle/>
           <a:p>
-            <a:fld id="{5586B75A-687E-405C-8A0B-8D00578BA2C3}" type="datetimeFigureOut">
-              <a:rPr lang="en-US" dirty="0"/>
-              <a:pPr/>
-              <a:t>11/10/2019</a:t>
+            <a:fld id="{C9BDFD75-3E5E-493A-BDB0-9BE7B4F7A3B9}" type="datetime1">
+              <a:rPr lang="en-US" smtClean="0"/>
+              <a:t>11/11/2019</a:t>
             </a:fld>
             <a:endParaRPr lang="en-US" dirty="0"/>
           </a:p>
@@ -2100,10 +2444,9 @@
           <a:bodyPr/>
           <a:lstStyle/>
           <a:p>
-            <a:fld id="{5586B75A-687E-405C-8A0B-8D00578BA2C3}" type="datetimeFigureOut">
-              <a:rPr lang="en-US" dirty="0"/>
-              <a:pPr/>
-              <a:t>11/10/2019</a:t>
+            <a:fld id="{9784E390-AB3B-4509-9AAA-B0CFE54B7C97}" type="datetime1">
+              <a:rPr lang="en-US" smtClean="0"/>
+              <a:t>11/11/2019</a:t>
             </a:fld>
             <a:endParaRPr lang="en-US" dirty="0"/>
           </a:p>
@@ -2410,10 +2753,9 @@
           <a:bodyPr/>
           <a:lstStyle/>
           <a:p>
-            <a:fld id="{5586B75A-687E-405C-8A0B-8D00578BA2C3}" type="datetimeFigureOut">
-              <a:rPr lang="en-US" dirty="0"/>
-              <a:pPr/>
-              <a:t>11/10/2019</a:t>
+            <a:fld id="{0E2EE00D-3B7C-4D97-B638-873C91D4496B}" type="datetime1">
+              <a:rPr lang="en-US" smtClean="0"/>
+              <a:t>11/11/2019</a:t>
             </a:fld>
             <a:endParaRPr lang="en-US" dirty="0"/>
           </a:p>
@@ -2705,10 +3047,9 @@
           <a:bodyPr/>
           <a:lstStyle/>
           <a:p>
-            <a:fld id="{5586B75A-687E-405C-8A0B-8D00578BA2C3}" type="datetimeFigureOut">
-              <a:rPr lang="en-US" dirty="0"/>
-              <a:pPr/>
-              <a:t>11/10/2019</a:t>
+            <a:fld id="{5CFD124D-20AC-45E2-B101-D2AADDBF1732}" type="datetime1">
+              <a:rPr lang="en-US" smtClean="0"/>
+              <a:t>11/11/2019</a:t>
             </a:fld>
             <a:endParaRPr lang="en-US" dirty="0"/>
           </a:p>
@@ -3014,10 +3355,9 @@
             </a:lvl1pPr>
           </a:lstStyle>
           <a:p>
-            <a:fld id="{5586B75A-687E-405C-8A0B-8D00578BA2C3}" type="datetimeFigureOut">
-              <a:rPr lang="en-US" dirty="0"/>
-              <a:pPr/>
-              <a:t>11/10/2019</a:t>
+            <a:fld id="{5FBFF77D-145D-4ADC-B75F-47891C511A35}" type="datetime1">
+              <a:rPr lang="en-US" smtClean="0"/>
+              <a:t>11/11/2019</a:t>
             </a:fld>
             <a:endParaRPr lang="en-US" dirty="0"/>
           </a:p>
@@ -3122,7 +3462,7 @@
     <p:sldLayoutId id="2147483862" r:id="rId10"/>
     <p:sldLayoutId id="2147483863" r:id="rId11"/>
   </p:sldLayoutIdLst>
-  <p:hf sldNum="0" hdr="0" ftr="0" dt="0"/>
+  <p:hf hdr="0" ftr="0" dt="0"/>
   <p:txStyles>
     <p:titleStyle>
       <a:lvl1pPr algn="l" defTabSz="914400" rtl="0" eaLnBrk="1" latinLnBrk="0" hangingPunct="1">
@@ -3571,6 +3911,36 @@
           </a:p>
         </p:txBody>
       </p:sp>
+      <p:sp>
+        <p:nvSpPr>
+          <p:cNvPr id="4" name="Номер слайда 3">
+            <a:extLst>
+              <a:ext uri="{FF2B5EF4-FFF2-40B4-BE49-F238E27FC236}">
+                <a16:creationId xmlns:a16="http://schemas.microsoft.com/office/drawing/2014/main" id="{8909CFBD-B91A-4BCF-97CE-1A24647C6254}"/>
+              </a:ext>
+            </a:extLst>
+          </p:cNvPr>
+          <p:cNvSpPr>
+            <a:spLocks noGrp="1"/>
+          </p:cNvSpPr>
+          <p:nvPr>
+            <p:ph type="sldNum" sz="quarter" idx="12"/>
+          </p:nvPr>
+        </p:nvSpPr>
+        <p:spPr/>
+        <p:txBody>
+          <a:bodyPr/>
+          <a:lstStyle/>
+          <a:p>
+            <a:fld id="{4FAB73BC-B049-4115-A692-8D63A059BFB8}" type="slidenum">
+              <a:rPr lang="en-US" smtClean="0"/>
+              <a:pPr/>
+              <a:t>1</a:t>
+            </a:fld>
+            <a:endParaRPr lang="en-US" dirty="0"/>
+          </a:p>
+        </p:txBody>
+      </p:sp>
     </p:spTree>
     <p:extLst>
       <p:ext uri="{BB962C8B-B14F-4D97-AF65-F5344CB8AC3E}">
@@ -3794,6 +4164,36 @@
           </a:prstGeom>
         </p:spPr>
       </p:pic>
+      <p:sp>
+        <p:nvSpPr>
+          <p:cNvPr id="8" name="Номер слайда 7">
+            <a:extLst>
+              <a:ext uri="{FF2B5EF4-FFF2-40B4-BE49-F238E27FC236}">
+                <a16:creationId xmlns:a16="http://schemas.microsoft.com/office/drawing/2014/main" id="{0DAB2802-634D-42B9-A72A-44F165D19FF5}"/>
+              </a:ext>
+            </a:extLst>
+          </p:cNvPr>
+          <p:cNvSpPr>
+            <a:spLocks noGrp="1"/>
+          </p:cNvSpPr>
+          <p:nvPr>
+            <p:ph type="sldNum" sz="quarter" idx="12"/>
+          </p:nvPr>
+        </p:nvSpPr>
+        <p:spPr/>
+        <p:txBody>
+          <a:bodyPr/>
+          <a:lstStyle/>
+          <a:p>
+            <a:fld id="{4FAB73BC-B049-4115-A692-8D63A059BFB8}" type="slidenum">
+              <a:rPr lang="en-US" smtClean="0"/>
+              <a:pPr/>
+              <a:t>10</a:t>
+            </a:fld>
+            <a:endParaRPr lang="en-US" dirty="0"/>
+          </a:p>
+        </p:txBody>
+      </p:sp>
     </p:spTree>
     <p:extLst>
       <p:ext uri="{BB962C8B-B14F-4D97-AF65-F5344CB8AC3E}">
@@ -3983,6 +4383,36 @@
           </a:p>
         </p:txBody>
       </p:sp>
+      <p:sp>
+        <p:nvSpPr>
+          <p:cNvPr id="7" name="Номер слайда 6">
+            <a:extLst>
+              <a:ext uri="{FF2B5EF4-FFF2-40B4-BE49-F238E27FC236}">
+                <a16:creationId xmlns:a16="http://schemas.microsoft.com/office/drawing/2014/main" id="{1D86A4C3-D5C1-4CED-A820-D793EDADD657}"/>
+              </a:ext>
+            </a:extLst>
+          </p:cNvPr>
+          <p:cNvSpPr>
+            <a:spLocks noGrp="1"/>
+          </p:cNvSpPr>
+          <p:nvPr>
+            <p:ph type="sldNum" sz="quarter" idx="12"/>
+          </p:nvPr>
+        </p:nvSpPr>
+        <p:spPr/>
+        <p:txBody>
+          <a:bodyPr/>
+          <a:lstStyle/>
+          <a:p>
+            <a:fld id="{4FAB73BC-B049-4115-A692-8D63A059BFB8}" type="slidenum">
+              <a:rPr lang="en-US" smtClean="0"/>
+              <a:pPr/>
+              <a:t>11</a:t>
+            </a:fld>
+            <a:endParaRPr lang="en-US" dirty="0"/>
+          </a:p>
+        </p:txBody>
+      </p:sp>
     </p:spTree>
     <p:extLst>
       <p:ext uri="{BB962C8B-B14F-4D97-AF65-F5344CB8AC3E}">
@@ -4166,6 +4596,36 @@
           </a:prstGeom>
         </p:spPr>
       </p:pic>
+      <p:sp>
+        <p:nvSpPr>
+          <p:cNvPr id="8" name="Номер слайда 7">
+            <a:extLst>
+              <a:ext uri="{FF2B5EF4-FFF2-40B4-BE49-F238E27FC236}">
+                <a16:creationId xmlns:a16="http://schemas.microsoft.com/office/drawing/2014/main" id="{81B4B7CB-31C3-4B4F-B4DC-32899CA5C53D}"/>
+              </a:ext>
+            </a:extLst>
+          </p:cNvPr>
+          <p:cNvSpPr>
+            <a:spLocks noGrp="1"/>
+          </p:cNvSpPr>
+          <p:nvPr>
+            <p:ph type="sldNum" sz="quarter" idx="12"/>
+          </p:nvPr>
+        </p:nvSpPr>
+        <p:spPr/>
+        <p:txBody>
+          <a:bodyPr/>
+          <a:lstStyle/>
+          <a:p>
+            <a:fld id="{4FAB73BC-B049-4115-A692-8D63A059BFB8}" type="slidenum">
+              <a:rPr lang="en-US" smtClean="0"/>
+              <a:pPr/>
+              <a:t>12</a:t>
+            </a:fld>
+            <a:endParaRPr lang="en-US" dirty="0"/>
+          </a:p>
+        </p:txBody>
+      </p:sp>
     </p:spTree>
     <p:extLst>
       <p:ext uri="{BB962C8B-B14F-4D97-AF65-F5344CB8AC3E}">
@@ -4391,6 +4851,36 @@
           </a:prstGeom>
         </p:spPr>
       </p:pic>
+      <p:sp>
+        <p:nvSpPr>
+          <p:cNvPr id="7" name="Номер слайда 6">
+            <a:extLst>
+              <a:ext uri="{FF2B5EF4-FFF2-40B4-BE49-F238E27FC236}">
+                <a16:creationId xmlns:a16="http://schemas.microsoft.com/office/drawing/2014/main" id="{EF0CB1E2-E9E3-4617-9E19-3945A0BD2518}"/>
+              </a:ext>
+            </a:extLst>
+          </p:cNvPr>
+          <p:cNvSpPr>
+            <a:spLocks noGrp="1"/>
+          </p:cNvSpPr>
+          <p:nvPr>
+            <p:ph type="sldNum" sz="quarter" idx="12"/>
+          </p:nvPr>
+        </p:nvSpPr>
+        <p:spPr/>
+        <p:txBody>
+          <a:bodyPr/>
+          <a:lstStyle/>
+          <a:p>
+            <a:fld id="{4FAB73BC-B049-4115-A692-8D63A059BFB8}" type="slidenum">
+              <a:rPr lang="en-US" smtClean="0"/>
+              <a:pPr/>
+              <a:t>13</a:t>
+            </a:fld>
+            <a:endParaRPr lang="en-US" dirty="0"/>
+          </a:p>
+        </p:txBody>
+      </p:sp>
     </p:spTree>
     <p:extLst>
       <p:ext uri="{BB962C8B-B14F-4D97-AF65-F5344CB8AC3E}">
@@ -4641,6 +5131,36 @@
           </a:p>
         </p:txBody>
       </p:sp>
+      <p:sp>
+        <p:nvSpPr>
+          <p:cNvPr id="6" name="Номер слайда 5">
+            <a:extLst>
+              <a:ext uri="{FF2B5EF4-FFF2-40B4-BE49-F238E27FC236}">
+                <a16:creationId xmlns:a16="http://schemas.microsoft.com/office/drawing/2014/main" id="{A5480F06-310B-4CA0-9A31-E4303BDC9FBB}"/>
+              </a:ext>
+            </a:extLst>
+          </p:cNvPr>
+          <p:cNvSpPr>
+            <a:spLocks noGrp="1"/>
+          </p:cNvSpPr>
+          <p:nvPr>
+            <p:ph type="sldNum" sz="quarter" idx="12"/>
+          </p:nvPr>
+        </p:nvSpPr>
+        <p:spPr/>
+        <p:txBody>
+          <a:bodyPr/>
+          <a:lstStyle/>
+          <a:p>
+            <a:fld id="{4FAB73BC-B049-4115-A692-8D63A059BFB8}" type="slidenum">
+              <a:rPr lang="en-US" smtClean="0"/>
+              <a:pPr/>
+              <a:t>14</a:t>
+            </a:fld>
+            <a:endParaRPr lang="en-US" dirty="0"/>
+          </a:p>
+        </p:txBody>
+      </p:sp>
     </p:spTree>
     <p:extLst>
       <p:ext uri="{BB962C8B-B14F-4D97-AF65-F5344CB8AC3E}">
@@ -4811,6 +5331,36 @@
           </a:p>
         </p:txBody>
       </p:sp>
+      <p:sp>
+        <p:nvSpPr>
+          <p:cNvPr id="4" name="Номер слайда 3">
+            <a:extLst>
+              <a:ext uri="{FF2B5EF4-FFF2-40B4-BE49-F238E27FC236}">
+                <a16:creationId xmlns:a16="http://schemas.microsoft.com/office/drawing/2014/main" id="{F578B1EB-CF39-4912-985C-C222BD9F8799}"/>
+              </a:ext>
+            </a:extLst>
+          </p:cNvPr>
+          <p:cNvSpPr>
+            <a:spLocks noGrp="1"/>
+          </p:cNvSpPr>
+          <p:nvPr>
+            <p:ph type="sldNum" sz="quarter" idx="12"/>
+          </p:nvPr>
+        </p:nvSpPr>
+        <p:spPr/>
+        <p:txBody>
+          <a:bodyPr/>
+          <a:lstStyle/>
+          <a:p>
+            <a:fld id="{4FAB73BC-B049-4115-A692-8D63A059BFB8}" type="slidenum">
+              <a:rPr lang="en-US" smtClean="0"/>
+              <a:pPr/>
+              <a:t>15</a:t>
+            </a:fld>
+            <a:endParaRPr lang="en-US" dirty="0"/>
+          </a:p>
+        </p:txBody>
+      </p:sp>
     </p:spTree>
     <p:extLst>
       <p:ext uri="{BB962C8B-B14F-4D97-AF65-F5344CB8AC3E}">
@@ -4993,6 +5543,36 @@
           </a:prstGeom>
         </p:spPr>
       </p:pic>
+      <p:sp>
+        <p:nvSpPr>
+          <p:cNvPr id="7" name="Номер слайда 6">
+            <a:extLst>
+              <a:ext uri="{FF2B5EF4-FFF2-40B4-BE49-F238E27FC236}">
+                <a16:creationId xmlns:a16="http://schemas.microsoft.com/office/drawing/2014/main" id="{5631236A-0B15-4E74-B751-6121E092B81C}"/>
+              </a:ext>
+            </a:extLst>
+          </p:cNvPr>
+          <p:cNvSpPr>
+            <a:spLocks noGrp="1"/>
+          </p:cNvSpPr>
+          <p:nvPr>
+            <p:ph type="sldNum" sz="quarter" idx="12"/>
+          </p:nvPr>
+        </p:nvSpPr>
+        <p:spPr/>
+        <p:txBody>
+          <a:bodyPr/>
+          <a:lstStyle/>
+          <a:p>
+            <a:fld id="{4FAB73BC-B049-4115-A692-8D63A059BFB8}" type="slidenum">
+              <a:rPr lang="en-US" smtClean="0"/>
+              <a:pPr/>
+              <a:t>16</a:t>
+            </a:fld>
+            <a:endParaRPr lang="en-US" dirty="0"/>
+          </a:p>
+        </p:txBody>
+      </p:sp>
     </p:spTree>
     <p:extLst>
       <p:ext uri="{BB962C8B-B14F-4D97-AF65-F5344CB8AC3E}">
@@ -5332,6 +5912,36 @@
           </a:p>
         </p:txBody>
       </p:sp>
+      <p:sp>
+        <p:nvSpPr>
+          <p:cNvPr id="5" name="Номер слайда 4">
+            <a:extLst>
+              <a:ext uri="{FF2B5EF4-FFF2-40B4-BE49-F238E27FC236}">
+                <a16:creationId xmlns:a16="http://schemas.microsoft.com/office/drawing/2014/main" id="{15E6C3E5-133D-4803-B784-8984A777A003}"/>
+              </a:ext>
+            </a:extLst>
+          </p:cNvPr>
+          <p:cNvSpPr>
+            <a:spLocks noGrp="1"/>
+          </p:cNvSpPr>
+          <p:nvPr>
+            <p:ph type="sldNum" sz="quarter" idx="12"/>
+          </p:nvPr>
+        </p:nvSpPr>
+        <p:spPr/>
+        <p:txBody>
+          <a:bodyPr/>
+          <a:lstStyle/>
+          <a:p>
+            <a:fld id="{4FAB73BC-B049-4115-A692-8D63A059BFB8}" type="slidenum">
+              <a:rPr lang="en-US" smtClean="0"/>
+              <a:pPr/>
+              <a:t>17</a:t>
+            </a:fld>
+            <a:endParaRPr lang="en-US" dirty="0"/>
+          </a:p>
+        </p:txBody>
+      </p:sp>
     </p:spTree>
     <p:extLst>
       <p:ext uri="{BB962C8B-B14F-4D97-AF65-F5344CB8AC3E}">
@@ -5419,6 +6029,36 @@
           </a:prstGeom>
         </p:spPr>
       </p:pic>
+      <p:sp>
+        <p:nvSpPr>
+          <p:cNvPr id="8" name="Номер слайда 7">
+            <a:extLst>
+              <a:ext uri="{FF2B5EF4-FFF2-40B4-BE49-F238E27FC236}">
+                <a16:creationId xmlns:a16="http://schemas.microsoft.com/office/drawing/2014/main" id="{1639A7DB-52A7-4552-A7EB-C22F6530122E}"/>
+              </a:ext>
+            </a:extLst>
+          </p:cNvPr>
+          <p:cNvSpPr>
+            <a:spLocks noGrp="1"/>
+          </p:cNvSpPr>
+          <p:nvPr>
+            <p:ph type="sldNum" sz="quarter" idx="12"/>
+          </p:nvPr>
+        </p:nvSpPr>
+        <p:spPr/>
+        <p:txBody>
+          <a:bodyPr/>
+          <a:lstStyle/>
+          <a:p>
+            <a:fld id="{4FAB73BC-B049-4115-A692-8D63A059BFB8}" type="slidenum">
+              <a:rPr lang="en-US" smtClean="0"/>
+              <a:pPr/>
+              <a:t>18</a:t>
+            </a:fld>
+            <a:endParaRPr lang="en-US" dirty="0"/>
+          </a:p>
+        </p:txBody>
+      </p:sp>
     </p:spTree>
     <p:extLst>
       <p:ext uri="{BB962C8B-B14F-4D97-AF65-F5344CB8AC3E}">
@@ -5538,6 +6178,36 @@
           </a:p>
         </p:txBody>
       </p:sp>
+      <p:sp>
+        <p:nvSpPr>
+          <p:cNvPr id="6" name="Номер слайда 5">
+            <a:extLst>
+              <a:ext uri="{FF2B5EF4-FFF2-40B4-BE49-F238E27FC236}">
+                <a16:creationId xmlns:a16="http://schemas.microsoft.com/office/drawing/2014/main" id="{8D3EEA73-E2D5-4CB6-B138-56A048247913}"/>
+              </a:ext>
+            </a:extLst>
+          </p:cNvPr>
+          <p:cNvSpPr>
+            <a:spLocks noGrp="1"/>
+          </p:cNvSpPr>
+          <p:nvPr>
+            <p:ph type="sldNum" sz="quarter" idx="12"/>
+          </p:nvPr>
+        </p:nvSpPr>
+        <p:spPr/>
+        <p:txBody>
+          <a:bodyPr/>
+          <a:lstStyle/>
+          <a:p>
+            <a:fld id="{4FAB73BC-B049-4115-A692-8D63A059BFB8}" type="slidenum">
+              <a:rPr lang="en-US" smtClean="0"/>
+              <a:pPr/>
+              <a:t>19</a:t>
+            </a:fld>
+            <a:endParaRPr lang="en-US" dirty="0"/>
+          </a:p>
+        </p:txBody>
+      </p:sp>
     </p:spTree>
     <p:extLst>
       <p:ext uri="{BB962C8B-B14F-4D97-AF65-F5344CB8AC3E}">
@@ -5659,6 +6329,36 @@
               <a:rPr lang="ru-RU" dirty="0"/>
               <a:t>также строятся «из коробки».</a:t>
             </a:r>
+          </a:p>
+        </p:txBody>
+      </p:sp>
+      <p:sp>
+        <p:nvSpPr>
+          <p:cNvPr id="8" name="Номер слайда 7">
+            <a:extLst>
+              <a:ext uri="{FF2B5EF4-FFF2-40B4-BE49-F238E27FC236}">
+                <a16:creationId xmlns:a16="http://schemas.microsoft.com/office/drawing/2014/main" id="{45B21801-E741-4728-A09B-2F315123E927}"/>
+              </a:ext>
+            </a:extLst>
+          </p:cNvPr>
+          <p:cNvSpPr>
+            <a:spLocks noGrp="1"/>
+          </p:cNvSpPr>
+          <p:nvPr>
+            <p:ph type="sldNum" sz="quarter" idx="12"/>
+          </p:nvPr>
+        </p:nvSpPr>
+        <p:spPr/>
+        <p:txBody>
+          <a:bodyPr/>
+          <a:lstStyle/>
+          <a:p>
+            <a:fld id="{4FAB73BC-B049-4115-A692-8D63A059BFB8}" type="slidenum">
+              <a:rPr lang="en-US" smtClean="0"/>
+              <a:pPr/>
+              <a:t>2</a:t>
+            </a:fld>
+            <a:endParaRPr lang="en-US" dirty="0"/>
           </a:p>
         </p:txBody>
       </p:sp>
@@ -6701,6 +7401,36 @@
           </a:p>
         </p:txBody>
       </p:sp>
+      <p:sp>
+        <p:nvSpPr>
+          <p:cNvPr id="7" name="Номер слайда 6">
+            <a:extLst>
+              <a:ext uri="{FF2B5EF4-FFF2-40B4-BE49-F238E27FC236}">
+                <a16:creationId xmlns:a16="http://schemas.microsoft.com/office/drawing/2014/main" id="{99D8207F-2134-4C8B-B813-EA3BFE3EDC5F}"/>
+              </a:ext>
+            </a:extLst>
+          </p:cNvPr>
+          <p:cNvSpPr>
+            <a:spLocks noGrp="1"/>
+          </p:cNvSpPr>
+          <p:nvPr>
+            <p:ph type="sldNum" sz="quarter" idx="12"/>
+          </p:nvPr>
+        </p:nvSpPr>
+        <p:spPr/>
+        <p:txBody>
+          <a:bodyPr/>
+          <a:lstStyle/>
+          <a:p>
+            <a:fld id="{4FAB73BC-B049-4115-A692-8D63A059BFB8}" type="slidenum">
+              <a:rPr lang="en-US" smtClean="0"/>
+              <a:pPr/>
+              <a:t>3</a:t>
+            </a:fld>
+            <a:endParaRPr lang="en-US" dirty="0"/>
+          </a:p>
+        </p:txBody>
+      </p:sp>
     </p:spTree>
     <p:extLst>
       <p:ext uri="{BB962C8B-B14F-4D97-AF65-F5344CB8AC3E}">
@@ -6819,6 +7549,36 @@
           </a:p>
         </p:txBody>
       </p:sp>
+      <p:sp>
+        <p:nvSpPr>
+          <p:cNvPr id="8" name="Номер слайда 7">
+            <a:extLst>
+              <a:ext uri="{FF2B5EF4-FFF2-40B4-BE49-F238E27FC236}">
+                <a16:creationId xmlns:a16="http://schemas.microsoft.com/office/drawing/2014/main" id="{B5CAD284-1A18-46B8-8F21-8C9A0C8814E6}"/>
+              </a:ext>
+            </a:extLst>
+          </p:cNvPr>
+          <p:cNvSpPr>
+            <a:spLocks noGrp="1"/>
+          </p:cNvSpPr>
+          <p:nvPr>
+            <p:ph type="sldNum" sz="quarter" idx="12"/>
+          </p:nvPr>
+        </p:nvSpPr>
+        <p:spPr/>
+        <p:txBody>
+          <a:bodyPr/>
+          <a:lstStyle/>
+          <a:p>
+            <a:fld id="{4FAB73BC-B049-4115-A692-8D63A059BFB8}" type="slidenum">
+              <a:rPr lang="en-US" smtClean="0"/>
+              <a:pPr/>
+              <a:t>4</a:t>
+            </a:fld>
+            <a:endParaRPr lang="en-US" dirty="0"/>
+          </a:p>
+        </p:txBody>
+      </p:sp>
     </p:spTree>
     <p:extLst>
       <p:ext uri="{BB962C8B-B14F-4D97-AF65-F5344CB8AC3E}">
@@ -6913,6 +7673,36 @@
           </a:p>
         </p:txBody>
       </p:sp>
+      <p:sp>
+        <p:nvSpPr>
+          <p:cNvPr id="7" name="Номер слайда 6">
+            <a:extLst>
+              <a:ext uri="{FF2B5EF4-FFF2-40B4-BE49-F238E27FC236}">
+                <a16:creationId xmlns:a16="http://schemas.microsoft.com/office/drawing/2014/main" id="{87FF0472-6760-4EE9-A121-833A515A155C}"/>
+              </a:ext>
+            </a:extLst>
+          </p:cNvPr>
+          <p:cNvSpPr>
+            <a:spLocks noGrp="1"/>
+          </p:cNvSpPr>
+          <p:nvPr>
+            <p:ph type="sldNum" sz="quarter" idx="12"/>
+          </p:nvPr>
+        </p:nvSpPr>
+        <p:spPr/>
+        <p:txBody>
+          <a:bodyPr/>
+          <a:lstStyle/>
+          <a:p>
+            <a:fld id="{4FAB73BC-B049-4115-A692-8D63A059BFB8}" type="slidenum">
+              <a:rPr lang="en-US" smtClean="0"/>
+              <a:pPr/>
+              <a:t>5</a:t>
+            </a:fld>
+            <a:endParaRPr lang="en-US" dirty="0"/>
+          </a:p>
+        </p:txBody>
+      </p:sp>
     </p:spTree>
     <p:extLst>
       <p:ext uri="{BB962C8B-B14F-4D97-AF65-F5344CB8AC3E}">
@@ -6999,6 +7789,36 @@
           </a:p>
         </p:txBody>
       </p:sp>
+      <p:sp>
+        <p:nvSpPr>
+          <p:cNvPr id="6" name="Номер слайда 5">
+            <a:extLst>
+              <a:ext uri="{FF2B5EF4-FFF2-40B4-BE49-F238E27FC236}">
+                <a16:creationId xmlns:a16="http://schemas.microsoft.com/office/drawing/2014/main" id="{6B83693A-1C47-4B64-A567-18D2E8F809C8}"/>
+              </a:ext>
+            </a:extLst>
+          </p:cNvPr>
+          <p:cNvSpPr>
+            <a:spLocks noGrp="1"/>
+          </p:cNvSpPr>
+          <p:nvPr>
+            <p:ph type="sldNum" sz="quarter" idx="12"/>
+          </p:nvPr>
+        </p:nvSpPr>
+        <p:spPr/>
+        <p:txBody>
+          <a:bodyPr/>
+          <a:lstStyle/>
+          <a:p>
+            <a:fld id="{4FAB73BC-B049-4115-A692-8D63A059BFB8}" type="slidenum">
+              <a:rPr lang="en-US" smtClean="0"/>
+              <a:pPr/>
+              <a:t>6</a:t>
+            </a:fld>
+            <a:endParaRPr lang="en-US" dirty="0"/>
+          </a:p>
+        </p:txBody>
+      </p:sp>
     </p:spTree>
     <p:extLst>
       <p:ext uri="{BB962C8B-B14F-4D97-AF65-F5344CB8AC3E}">
@@ -7157,6 +7977,36 @@
           </a:p>
         </p:txBody>
       </p:sp>
+      <p:sp>
+        <p:nvSpPr>
+          <p:cNvPr id="4" name="Номер слайда 3">
+            <a:extLst>
+              <a:ext uri="{FF2B5EF4-FFF2-40B4-BE49-F238E27FC236}">
+                <a16:creationId xmlns:a16="http://schemas.microsoft.com/office/drawing/2014/main" id="{AEA02046-677F-4145-9376-DDFF0A7388A7}"/>
+              </a:ext>
+            </a:extLst>
+          </p:cNvPr>
+          <p:cNvSpPr>
+            <a:spLocks noGrp="1"/>
+          </p:cNvSpPr>
+          <p:nvPr>
+            <p:ph type="sldNum" sz="quarter" idx="12"/>
+          </p:nvPr>
+        </p:nvSpPr>
+        <p:spPr/>
+        <p:txBody>
+          <a:bodyPr/>
+          <a:lstStyle/>
+          <a:p>
+            <a:fld id="{4FAB73BC-B049-4115-A692-8D63A059BFB8}" type="slidenum">
+              <a:rPr lang="en-US" smtClean="0"/>
+              <a:pPr/>
+              <a:t>7</a:t>
+            </a:fld>
+            <a:endParaRPr lang="en-US" dirty="0"/>
+          </a:p>
+        </p:txBody>
+      </p:sp>
     </p:spTree>
     <p:extLst>
       <p:ext uri="{BB962C8B-B14F-4D97-AF65-F5344CB8AC3E}">
@@ -7240,6 +8090,36 @@
           </a:p>
         </p:txBody>
       </p:sp>
+      <p:sp>
+        <p:nvSpPr>
+          <p:cNvPr id="4" name="Номер слайда 3">
+            <a:extLst>
+              <a:ext uri="{FF2B5EF4-FFF2-40B4-BE49-F238E27FC236}">
+                <a16:creationId xmlns:a16="http://schemas.microsoft.com/office/drawing/2014/main" id="{E5FA3A8E-CE5A-473A-A665-E20834E48B8D}"/>
+              </a:ext>
+            </a:extLst>
+          </p:cNvPr>
+          <p:cNvSpPr>
+            <a:spLocks noGrp="1"/>
+          </p:cNvSpPr>
+          <p:nvPr>
+            <p:ph type="sldNum" sz="quarter" idx="12"/>
+          </p:nvPr>
+        </p:nvSpPr>
+        <p:spPr/>
+        <p:txBody>
+          <a:bodyPr/>
+          <a:lstStyle/>
+          <a:p>
+            <a:fld id="{4FAB73BC-B049-4115-A692-8D63A059BFB8}" type="slidenum">
+              <a:rPr lang="en-US" smtClean="0"/>
+              <a:pPr/>
+              <a:t>8</a:t>
+            </a:fld>
+            <a:endParaRPr lang="en-US" dirty="0"/>
+          </a:p>
+        </p:txBody>
+      </p:sp>
     </p:spTree>
     <p:extLst>
       <p:ext uri="{BB962C8B-B14F-4D97-AF65-F5344CB8AC3E}">
@@ -7435,6 +8315,36 @@
           </a:prstGeom>
         </p:spPr>
       </p:pic>
+      <p:sp>
+        <p:nvSpPr>
+          <p:cNvPr id="8" name="Номер слайда 7">
+            <a:extLst>
+              <a:ext uri="{FF2B5EF4-FFF2-40B4-BE49-F238E27FC236}">
+                <a16:creationId xmlns:a16="http://schemas.microsoft.com/office/drawing/2014/main" id="{0DD10F9A-2457-47F2-924D-7FFEB43278BA}"/>
+              </a:ext>
+            </a:extLst>
+          </p:cNvPr>
+          <p:cNvSpPr>
+            <a:spLocks noGrp="1"/>
+          </p:cNvSpPr>
+          <p:nvPr>
+            <p:ph type="sldNum" sz="quarter" idx="12"/>
+          </p:nvPr>
+        </p:nvSpPr>
+        <p:spPr/>
+        <p:txBody>
+          <a:bodyPr/>
+          <a:lstStyle/>
+          <a:p>
+            <a:fld id="{4FAB73BC-B049-4115-A692-8D63A059BFB8}" type="slidenum">
+              <a:rPr lang="en-US" smtClean="0"/>
+              <a:pPr/>
+              <a:t>9</a:t>
+            </a:fld>
+            <a:endParaRPr lang="en-US" dirty="0"/>
+          </a:p>
+        </p:txBody>
+      </p:sp>
     </p:spTree>
     <p:extLst>
       <p:ext uri="{BB962C8B-B14F-4D97-AF65-F5344CB8AC3E}">
@@ -7677,4 +8587,299 @@
     </a:ext>
   </a:extLst>
 </a:theme>
+</file>
+
+<file path=ppt/theme/theme2.xml><?xml version="1.0" encoding="utf-8"?>
+<a:theme xmlns:a="http://schemas.openxmlformats.org/drawingml/2006/main" name="Тема Office">
+  <a:themeElements>
+    <a:clrScheme name="Стандартная">
+      <a:dk1>
+        <a:sysClr val="windowText" lastClr="000000"/>
+      </a:dk1>
+      <a:lt1>
+        <a:sysClr val="window" lastClr="FFFFFF"/>
+      </a:lt1>
+      <a:dk2>
+        <a:srgbClr val="44546A"/>
+      </a:dk2>
+      <a:lt2>
+        <a:srgbClr val="E7E6E6"/>
+      </a:lt2>
+      <a:accent1>
+        <a:srgbClr val="4472C4"/>
+      </a:accent1>
+      <a:accent2>
+        <a:srgbClr val="ED7D31"/>
+      </a:accent2>
+      <a:accent3>
+        <a:srgbClr val="A5A5A5"/>
+      </a:accent3>
+      <a:accent4>
+        <a:srgbClr val="FFC000"/>
+      </a:accent4>
+      <a:accent5>
+        <a:srgbClr val="5B9BD5"/>
+      </a:accent5>
+      <a:accent6>
+        <a:srgbClr val="70AD47"/>
+      </a:accent6>
+      <a:hlink>
+        <a:srgbClr val="0563C1"/>
+      </a:hlink>
+      <a:folHlink>
+        <a:srgbClr val="954F72"/>
+      </a:folHlink>
+    </a:clrScheme>
+    <a:fontScheme name="Стандартная">
+      <a:majorFont>
+        <a:latin typeface="Calibri Light" panose="020F0302020204030204"/>
+        <a:ea typeface=""/>
+        <a:cs typeface=""/>
+        <a:font script="Jpan" typeface="游ゴシック Light"/>
+        <a:font script="Hang" typeface="맑은 고딕"/>
+        <a:font script="Hans" typeface="等线 Light"/>
+        <a:font script="Hant" typeface="新細明體"/>
+        <a:font script="Arab" typeface="Times New Roman"/>
+        <a:font script="Hebr" typeface="Times New Roman"/>
+        <a:font script="Thai" typeface="Angsana New"/>
+        <a:font script="Ethi" typeface="Nyala"/>
+        <a:font script="Beng" typeface="Vrinda"/>
+        <a:font script="Gujr" typeface="Shruti"/>
+        <a:font script="Khmr" typeface="MoolBoran"/>
+        <a:font script="Knda" typeface="Tunga"/>
+        <a:font script="Guru" typeface="Raavi"/>
+        <a:font script="Cans" typeface="Euphemia"/>
+        <a:font script="Cher" typeface="Plantagenet Cherokee"/>
+        <a:font script="Yiii" typeface="Microsoft Yi Baiti"/>
+        <a:font script="Tibt" typeface="Microsoft Himalaya"/>
+        <a:font script="Thaa" typeface="MV Boli"/>
+        <a:font script="Deva" typeface="Mangal"/>
+        <a:font script="Telu" typeface="Gautami"/>
+        <a:font script="Taml" typeface="Latha"/>
+        <a:font script="Syrc" typeface="Estrangelo Edessa"/>
+        <a:font script="Orya" typeface="Kalinga"/>
+        <a:font script="Mlym" typeface="Kartika"/>
+        <a:font script="Laoo" typeface="DokChampa"/>
+        <a:font script="Sinh" typeface="Iskoola Pota"/>
+        <a:font script="Mong" typeface="Mongolian Baiti"/>
+        <a:font script="Viet" typeface="Times New Roman"/>
+        <a:font script="Uigh" typeface="Microsoft Uighur"/>
+        <a:font script="Geor" typeface="Sylfaen"/>
+        <a:font script="Armn" typeface="Arial"/>
+        <a:font script="Bugi" typeface="Leelawadee UI"/>
+        <a:font script="Bopo" typeface="Microsoft JhengHei"/>
+        <a:font script="Java" typeface="Javanese Text"/>
+        <a:font script="Lisu" typeface="Segoe UI"/>
+        <a:font script="Mymr" typeface="Myanmar Text"/>
+        <a:font script="Nkoo" typeface="Ebrima"/>
+        <a:font script="Olck" typeface="Nirmala UI"/>
+        <a:font script="Osma" typeface="Ebrima"/>
+        <a:font script="Phag" typeface="Phagspa"/>
+        <a:font script="Syrn" typeface="Estrangelo Edessa"/>
+        <a:font script="Syrj" typeface="Estrangelo Edessa"/>
+        <a:font script="Syre" typeface="Estrangelo Edessa"/>
+        <a:font script="Sora" typeface="Nirmala UI"/>
+        <a:font script="Tale" typeface="Microsoft Tai Le"/>
+        <a:font script="Talu" typeface="Microsoft New Tai Lue"/>
+        <a:font script="Tfng" typeface="Ebrima"/>
+      </a:majorFont>
+      <a:minorFont>
+        <a:latin typeface="Calibri" panose="020F0502020204030204"/>
+        <a:ea typeface=""/>
+        <a:cs typeface=""/>
+        <a:font script="Jpan" typeface="游ゴシック"/>
+        <a:font script="Hang" typeface="맑은 고딕"/>
+        <a:font script="Hans" typeface="等线"/>
+        <a:font script="Hant" typeface="新細明體"/>
+        <a:font script="Arab" typeface="Arial"/>
+        <a:font script="Hebr" typeface="Arial"/>
+        <a:font script="Thai" typeface="Cordia New"/>
+        <a:font script="Ethi" typeface="Nyala"/>
+        <a:font script="Beng" typeface="Vrinda"/>
+        <a:font script="Gujr" typeface="Shruti"/>
+        <a:font script="Khmr" typeface="DaunPenh"/>
+        <a:font script="Knda" typeface="Tunga"/>
+        <a:font script="Guru" typeface="Raavi"/>
+        <a:font script="Cans" typeface="Euphemia"/>
+        <a:font script="Cher" typeface="Plantagenet Cherokee"/>
+        <a:font script="Yiii" typeface="Microsoft Yi Baiti"/>
+        <a:font script="Tibt" typeface="Microsoft Himalaya"/>
+        <a:font script="Thaa" typeface="MV Boli"/>
+        <a:font script="Deva" typeface="Mangal"/>
+        <a:font script="Telu" typeface="Gautami"/>
+        <a:font script="Taml" typeface="Latha"/>
+        <a:font script="Syrc" typeface="Estrangelo Edessa"/>
+        <a:font script="Orya" typeface="Kalinga"/>
+        <a:font script="Mlym" typeface="Kartika"/>
+        <a:font script="Laoo" typeface="DokChampa"/>
+        <a:font script="Sinh" typeface="Iskoola Pota"/>
+        <a:font script="Mong" typeface="Mongolian Baiti"/>
+        <a:font script="Viet" typeface="Arial"/>
+        <a:font script="Uigh" typeface="Microsoft Uighur"/>
+        <a:font script="Geor" typeface="Sylfaen"/>
+        <a:font script="Armn" typeface="Arial"/>
+        <a:font script="Bugi" typeface="Leelawadee UI"/>
+        <a:font script="Bopo" typeface="Microsoft JhengHei"/>
+        <a:font script="Java" typeface="Javanese Text"/>
+        <a:font script="Lisu" typeface="Segoe UI"/>
+        <a:font script="Mymr" typeface="Myanmar Text"/>
+        <a:font script="Nkoo" typeface="Ebrima"/>
+        <a:font script="Olck" typeface="Nirmala UI"/>
+        <a:font script="Osma" typeface="Ebrima"/>
+        <a:font script="Phag" typeface="Phagspa"/>
+        <a:font script="Syrn" typeface="Estrangelo Edessa"/>
+        <a:font script="Syrj" typeface="Estrangelo Edessa"/>
+        <a:font script="Syre" typeface="Estrangelo Edessa"/>
+        <a:font script="Sora" typeface="Nirmala UI"/>
+        <a:font script="Tale" typeface="Microsoft Tai Le"/>
+        <a:font script="Talu" typeface="Microsoft New Tai Lue"/>
+        <a:font script="Tfng" typeface="Ebrima"/>
+      </a:minorFont>
+    </a:fontScheme>
+    <a:fmtScheme name="Стандартная">
+      <a:fillStyleLst>
+        <a:solidFill>
+          <a:schemeClr val="phClr"/>
+        </a:solidFill>
+        <a:gradFill rotWithShape="1">
+          <a:gsLst>
+            <a:gs pos="0">
+              <a:schemeClr val="phClr">
+                <a:lumMod val="110000"/>
+                <a:satMod val="105000"/>
+                <a:tint val="67000"/>
+              </a:schemeClr>
+            </a:gs>
+            <a:gs pos="50000">
+              <a:schemeClr val="phClr">
+                <a:lumMod val="105000"/>
+                <a:satMod val="103000"/>
+                <a:tint val="73000"/>
+              </a:schemeClr>
+            </a:gs>
+            <a:gs pos="100000">
+              <a:schemeClr val="phClr">
+                <a:lumMod val="105000"/>
+                <a:satMod val="109000"/>
+                <a:tint val="81000"/>
+              </a:schemeClr>
+            </a:gs>
+          </a:gsLst>
+          <a:lin ang="5400000" scaled="0"/>
+        </a:gradFill>
+        <a:gradFill rotWithShape="1">
+          <a:gsLst>
+            <a:gs pos="0">
+              <a:schemeClr val="phClr">
+                <a:satMod val="103000"/>
+                <a:lumMod val="102000"/>
+                <a:tint val="94000"/>
+              </a:schemeClr>
+            </a:gs>
+            <a:gs pos="50000">
+              <a:schemeClr val="phClr">
+                <a:satMod val="110000"/>
+                <a:lumMod val="100000"/>
+                <a:shade val="100000"/>
+              </a:schemeClr>
+            </a:gs>
+            <a:gs pos="100000">
+              <a:schemeClr val="phClr">
+                <a:lumMod val="99000"/>
+                <a:satMod val="120000"/>
+                <a:shade val="78000"/>
+              </a:schemeClr>
+            </a:gs>
+          </a:gsLst>
+          <a:lin ang="5400000" scaled="0"/>
+        </a:gradFill>
+      </a:fillStyleLst>
+      <a:lnStyleLst>
+        <a:ln w="6350" cap="flat" cmpd="sng" algn="ctr">
+          <a:solidFill>
+            <a:schemeClr val="phClr"/>
+          </a:solidFill>
+          <a:prstDash val="solid"/>
+          <a:miter lim="800000"/>
+        </a:ln>
+        <a:ln w="12700" cap="flat" cmpd="sng" algn="ctr">
+          <a:solidFill>
+            <a:schemeClr val="phClr"/>
+          </a:solidFill>
+          <a:prstDash val="solid"/>
+          <a:miter lim="800000"/>
+        </a:ln>
+        <a:ln w="19050" cap="flat" cmpd="sng" algn="ctr">
+          <a:solidFill>
+            <a:schemeClr val="phClr"/>
+          </a:solidFill>
+          <a:prstDash val="solid"/>
+          <a:miter lim="800000"/>
+        </a:ln>
+      </a:lnStyleLst>
+      <a:effectStyleLst>
+        <a:effectStyle>
+          <a:effectLst/>
+        </a:effectStyle>
+        <a:effectStyle>
+          <a:effectLst/>
+        </a:effectStyle>
+        <a:effectStyle>
+          <a:effectLst>
+            <a:outerShdw blurRad="57150" dist="19050" dir="5400000" algn="ctr" rotWithShape="0">
+              <a:srgbClr val="000000">
+                <a:alpha val="63000"/>
+              </a:srgbClr>
+            </a:outerShdw>
+          </a:effectLst>
+        </a:effectStyle>
+      </a:effectStyleLst>
+      <a:bgFillStyleLst>
+        <a:solidFill>
+          <a:schemeClr val="phClr"/>
+        </a:solidFill>
+        <a:solidFill>
+          <a:schemeClr val="phClr">
+            <a:tint val="95000"/>
+            <a:satMod val="170000"/>
+          </a:schemeClr>
+        </a:solidFill>
+        <a:gradFill rotWithShape="1">
+          <a:gsLst>
+            <a:gs pos="0">
+              <a:schemeClr val="phClr">
+                <a:tint val="93000"/>
+                <a:satMod val="150000"/>
+                <a:shade val="98000"/>
+                <a:lumMod val="102000"/>
+              </a:schemeClr>
+            </a:gs>
+            <a:gs pos="50000">
+              <a:schemeClr val="phClr">
+                <a:tint val="98000"/>
+                <a:satMod val="130000"/>
+                <a:shade val="90000"/>
+                <a:lumMod val="103000"/>
+              </a:schemeClr>
+            </a:gs>
+            <a:gs pos="100000">
+              <a:schemeClr val="phClr">
+                <a:shade val="63000"/>
+                <a:satMod val="120000"/>
+              </a:schemeClr>
+            </a:gs>
+          </a:gsLst>
+          <a:lin ang="5400000" scaled="0"/>
+        </a:gradFill>
+      </a:bgFillStyleLst>
+    </a:fmtScheme>
+  </a:themeElements>
+  <a:objectDefaults/>
+  <a:extraClrSchemeLst/>
+  <a:extLst>
+    <a:ext uri="{05A4C25C-085E-4340-85A3-A5531E510DB2}">
+      <thm15:themeFamily xmlns:thm15="http://schemas.microsoft.com/office/thememl/2012/main" name="Office Theme" id="{62F939B6-93AF-4DB8-9C6B-D6C7DFDC589F}" vid="{4A3C46E8-61CC-4603-A589-7422A47A8E4A}"/>
+    </a:ext>
+  </a:extLst>
+</a:theme>
 </file>
</xml_diff>

<commit_message>
add np6 and ppt numpy2 changed np6 changed np6 for more consistence style add np6_1 and done 02 numpy presentation
</commit_message>
<xml_diff>
--- a/02 NUMPY 2.pptx
+++ b/02 NUMPY 2.pptx
@@ -5,7 +5,7 @@
     <p:sldMasterId id="2147483852" r:id="rId1"/>
   </p:sldMasterIdLst>
   <p:notesMasterIdLst>
-    <p:notesMasterId r:id="rId21"/>
+    <p:notesMasterId r:id="rId29"/>
   </p:notesMasterIdLst>
   <p:sldIdLst>
     <p:sldId id="256" r:id="rId2"/>
@@ -25,8 +25,16 @@
     <p:sldId id="270" r:id="rId16"/>
     <p:sldId id="271" r:id="rId17"/>
     <p:sldId id="272" r:id="rId18"/>
-    <p:sldId id="273" r:id="rId19"/>
-    <p:sldId id="274" r:id="rId20"/>
+    <p:sldId id="274" r:id="rId19"/>
+    <p:sldId id="275" r:id="rId20"/>
+    <p:sldId id="276" r:id="rId21"/>
+    <p:sldId id="277" r:id="rId22"/>
+    <p:sldId id="278" r:id="rId23"/>
+    <p:sldId id="279" r:id="rId24"/>
+    <p:sldId id="280" r:id="rId25"/>
+    <p:sldId id="281" r:id="rId26"/>
+    <p:sldId id="282" r:id="rId27"/>
+    <p:sldId id="283" r:id="rId28"/>
   </p:sldIdLst>
   <p:sldSz cx="12192000" cy="6858000"/>
   <p:notesSz cx="6858000" cy="9144000"/>
@@ -226,7 +234,7 @@
           <a:p>
             <a:fld id="{5F7BEC9E-3FFB-4D35-B6F5-4EE814FE9D22}" type="datetimeFigureOut">
               <a:rPr lang="ru-RU" smtClean="0"/>
-              <a:t>11.11.2019</a:t>
+              <a:t>16.11.2019</a:t>
             </a:fld>
             <a:endParaRPr lang="ru-RU"/>
           </a:p>
@@ -717,7 +725,7 @@
           <a:p>
             <a:fld id="{68B43250-E171-4F27-A220-4A21B05284E2}" type="datetime1">
               <a:rPr lang="en-US" smtClean="0"/>
-              <a:t>11/11/2019</a:t>
+              <a:t>11/16/2019</a:t>
             </a:fld>
             <a:endParaRPr lang="en-US" dirty="0"/>
           </a:p>
@@ -888,7 +896,7 @@
           <a:p>
             <a:fld id="{9B62C86F-B128-4E7E-A6CB-8B9E061CA36D}" type="datetime1">
               <a:rPr lang="en-US" smtClean="0"/>
-              <a:t>11/11/2019</a:t>
+              <a:t>11/16/2019</a:t>
             </a:fld>
             <a:endParaRPr lang="en-US" dirty="0"/>
           </a:p>
@@ -1069,7 +1077,7 @@
           <a:p>
             <a:fld id="{7763122E-3DE7-449D-9D0E-C99BF8860546}" type="datetime1">
               <a:rPr lang="en-US" smtClean="0"/>
-              <a:t>11/11/2019</a:t>
+              <a:t>11/16/2019</a:t>
             </a:fld>
             <a:endParaRPr lang="en-US" dirty="0"/>
           </a:p>
@@ -1240,7 +1248,7 @@
           <a:p>
             <a:fld id="{812906CB-909A-474C-987B-4B0C22244BFB}" type="datetime1">
               <a:rPr lang="en-US" smtClean="0"/>
-              <a:t>11/11/2019</a:t>
+              <a:t>11/16/2019</a:t>
             </a:fld>
             <a:endParaRPr lang="en-US" dirty="0"/>
           </a:p>
@@ -1499,7 +1507,7 @@
           <a:p>
             <a:fld id="{EE9B6497-86BA-4A2E-9F36-22357EE374EA}" type="datetime1">
               <a:rPr lang="en-US" smtClean="0"/>
-              <a:t>11/11/2019</a:t>
+              <a:t>11/16/2019</a:t>
             </a:fld>
             <a:endParaRPr lang="en-US" dirty="0"/>
           </a:p>
@@ -1788,7 +1796,7 @@
           <a:p>
             <a:fld id="{FCDAC2B8-9E5F-49B3-AFCB-BF7939766EE2}" type="datetime1">
               <a:rPr lang="en-US" smtClean="0"/>
-              <a:t>11/11/2019</a:t>
+              <a:t>11/16/2019</a:t>
             </a:fld>
             <a:endParaRPr lang="en-US" dirty="0"/>
           </a:p>
@@ -2231,7 +2239,7 @@
           <a:p>
             <a:fld id="{6BDDE732-B1CF-4BD6-9169-D8BBD5B4E29A}" type="datetime1">
               <a:rPr lang="en-US" smtClean="0"/>
-              <a:t>11/11/2019</a:t>
+              <a:t>11/16/2019</a:t>
             </a:fld>
             <a:endParaRPr lang="en-US" dirty="0"/>
           </a:p>
@@ -2350,7 +2358,7 @@
           <a:p>
             <a:fld id="{C9BDFD75-3E5E-493A-BDB0-9BE7B4F7A3B9}" type="datetime1">
               <a:rPr lang="en-US" smtClean="0"/>
-              <a:t>11/11/2019</a:t>
+              <a:t>11/16/2019</a:t>
             </a:fld>
             <a:endParaRPr lang="en-US" dirty="0"/>
           </a:p>
@@ -2446,7 +2454,7 @@
           <a:p>
             <a:fld id="{9784E390-AB3B-4509-9AAA-B0CFE54B7C97}" type="datetime1">
               <a:rPr lang="en-US" smtClean="0"/>
-              <a:t>11/11/2019</a:t>
+              <a:t>11/16/2019</a:t>
             </a:fld>
             <a:endParaRPr lang="en-US" dirty="0"/>
           </a:p>
@@ -2755,7 +2763,7 @@
           <a:p>
             <a:fld id="{0E2EE00D-3B7C-4D97-B638-873C91D4496B}" type="datetime1">
               <a:rPr lang="en-US" smtClean="0"/>
-              <a:t>11/11/2019</a:t>
+              <a:t>11/16/2019</a:t>
             </a:fld>
             <a:endParaRPr lang="en-US" dirty="0"/>
           </a:p>
@@ -3049,7 +3057,7 @@
           <a:p>
             <a:fld id="{5CFD124D-20AC-45E2-B101-D2AADDBF1732}" type="datetime1">
               <a:rPr lang="en-US" smtClean="0"/>
-              <a:t>11/11/2019</a:t>
+              <a:t>11/16/2019</a:t>
             </a:fld>
             <a:endParaRPr lang="en-US" dirty="0"/>
           </a:p>
@@ -3357,7 +3365,7 @@
           <a:p>
             <a:fld id="{5FBFF77D-145D-4ADC-B75F-47891C511A35}" type="datetime1">
               <a:rPr lang="en-US" smtClean="0"/>
-              <a:t>11/11/2019</a:t>
+              <a:t>11/16/2019</a:t>
             </a:fld>
             <a:endParaRPr lang="en-US" dirty="0"/>
           </a:p>
@@ -4819,12 +4827,42 @@
           </a:p>
         </p:txBody>
       </p:sp>
+      <p:sp>
+        <p:nvSpPr>
+          <p:cNvPr id="7" name="Номер слайда 6">
+            <a:extLst>
+              <a:ext uri="{FF2B5EF4-FFF2-40B4-BE49-F238E27FC236}">
+                <a16:creationId xmlns:a16="http://schemas.microsoft.com/office/drawing/2014/main" id="{EF0CB1E2-E9E3-4617-9E19-3945A0BD2518}"/>
+              </a:ext>
+            </a:extLst>
+          </p:cNvPr>
+          <p:cNvSpPr>
+            <a:spLocks noGrp="1"/>
+          </p:cNvSpPr>
+          <p:nvPr>
+            <p:ph type="sldNum" sz="quarter" idx="12"/>
+          </p:nvPr>
+        </p:nvSpPr>
+        <p:spPr/>
+        <p:txBody>
+          <a:bodyPr/>
+          <a:lstStyle/>
+          <a:p>
+            <a:fld id="{4FAB73BC-B049-4115-A692-8D63A059BFB8}" type="slidenum">
+              <a:rPr lang="en-US" smtClean="0"/>
+              <a:pPr/>
+              <a:t>13</a:t>
+            </a:fld>
+            <a:endParaRPr lang="en-US" dirty="0"/>
+          </a:p>
+        </p:txBody>
+      </p:sp>
       <p:pic>
         <p:nvPicPr>
-          <p:cNvPr id="6" name="Объект 5">
+          <p:cNvPr id="8" name="Объект 7">
             <a:extLst>
               <a:ext uri="{FF2B5EF4-FFF2-40B4-BE49-F238E27FC236}">
-                <a16:creationId xmlns:a16="http://schemas.microsoft.com/office/drawing/2014/main" id="{5F2F79B9-7370-49E6-A508-1842DBC803B1}"/>
+                <a16:creationId xmlns:a16="http://schemas.microsoft.com/office/drawing/2014/main" id="{338BB352-DA4D-48EA-BCCD-C2CCC1726D99}"/>
               </a:ext>
             </a:extLst>
           </p:cNvPr>
@@ -4843,44 +4881,14 @@
         </p:blipFill>
         <p:spPr>
           <a:xfrm>
-            <a:off x="5963065" y="2810577"/>
-            <a:ext cx="5779756" cy="679971"/>
+            <a:off x="6174695" y="2794958"/>
+            <a:ext cx="5447775" cy="715993"/>
           </a:xfrm>
           <a:prstGeom prst="rect">
             <a:avLst/>
           </a:prstGeom>
         </p:spPr>
       </p:pic>
-      <p:sp>
-        <p:nvSpPr>
-          <p:cNvPr id="7" name="Номер слайда 6">
-            <a:extLst>
-              <a:ext uri="{FF2B5EF4-FFF2-40B4-BE49-F238E27FC236}">
-                <a16:creationId xmlns:a16="http://schemas.microsoft.com/office/drawing/2014/main" id="{EF0CB1E2-E9E3-4617-9E19-3945A0BD2518}"/>
-              </a:ext>
-            </a:extLst>
-          </p:cNvPr>
-          <p:cNvSpPr>
-            <a:spLocks noGrp="1"/>
-          </p:cNvSpPr>
-          <p:nvPr>
-            <p:ph type="sldNum" sz="quarter" idx="12"/>
-          </p:nvPr>
-        </p:nvSpPr>
-        <p:spPr/>
-        <p:txBody>
-          <a:bodyPr/>
-          <a:lstStyle/>
-          <a:p>
-            <a:fld id="{4FAB73BC-B049-4115-A692-8D63A059BFB8}" type="slidenum">
-              <a:rPr lang="en-US" smtClean="0"/>
-              <a:pPr/>
-              <a:t>13</a:t>
-            </a:fld>
-            <a:endParaRPr lang="en-US" dirty="0"/>
-          </a:p>
-        </p:txBody>
-      </p:sp>
     </p:spTree>
     <p:extLst>
       <p:ext uri="{BB962C8B-B14F-4D97-AF65-F5344CB8AC3E}">
@@ -4981,7 +4989,23 @@
             </a:r>
             <a:r>
               <a:rPr lang="ru-RU" dirty="0"/>
-              <a:t>, а часто еще и указывают условия отбора</a:t>
+              <a:t>,</a:t>
+            </a:r>
+            <a:r>
+              <a:rPr lang="en-US" dirty="0"/>
+              <a:t> </a:t>
+            </a:r>
+            <a:r>
+              <a:rPr lang="ru-RU" dirty="0"/>
+              <a:t>где </a:t>
+            </a:r>
+            <a:r>
+              <a:rPr lang="en-US" dirty="0"/>
+              <a:t>var1 </a:t>
+            </a:r>
+            <a:r>
+              <a:rPr lang="ru-RU" dirty="0"/>
+              <a:t>название, а часто еще и указывают условия отбора</a:t>
             </a:r>
           </a:p>
           <a:p>
@@ -5253,8 +5277,13 @@
           <a:p>
             <a:r>
               <a:rPr lang="ru-RU" dirty="0"/>
-              <a:t>Названия регионов </a:t>
-            </a:r>
+              <a:t>Названия регионов (в том числе </a:t>
+            </a:r>
+            <a:r>
+              <a:rPr lang="en-US" dirty="0"/>
+              <a:t>World)</a:t>
+            </a:r>
+            <a:endParaRPr lang="ru-RU" dirty="0"/>
           </a:p>
           <a:p>
             <a:pPr lvl="1"/>
@@ -5322,8 +5351,13 @@
           <a:p>
             <a:r>
               <a:rPr lang="ru-RU" dirty="0"/>
-              <a:t>Выделим соответствующие переменные (см. следующий слайд)</a:t>
-            </a:r>
+              <a:t>Выделим соответствующие переменные (см. следующий слайд) в массивы </a:t>
+            </a:r>
+            <a:r>
+              <a:rPr lang="en-US" dirty="0" err="1"/>
+              <a:t>numpy</a:t>
+            </a:r>
+            <a:endParaRPr lang="ru-RU" dirty="0"/>
           </a:p>
           <a:p>
             <a:pPr lvl="1"/>
@@ -5409,10 +5443,15 @@
         </p:nvSpPr>
         <p:spPr/>
         <p:txBody>
-          <a:bodyPr/>
-          <a:lstStyle/>
-          <a:p>
-            <a:endParaRPr lang="ru-RU"/>
+          <a:bodyPr>
+            <a:normAutofit fontScale="90000"/>
+          </a:bodyPr>
+          <a:lstStyle/>
+          <a:p>
+            <a:r>
+              <a:rPr lang="ru-RU" dirty="0"/>
+              <a:t>Берем колонку из таблицы по ее номеру и извлекаем значения</a:t>
+            </a:r>
           </a:p>
         </p:txBody>
       </p:sp>
@@ -5624,7 +5663,7 @@
           <a:bodyPr/>
           <a:lstStyle/>
           <a:p>
-            <a:endParaRPr lang="ru-RU"/>
+            <a:endParaRPr lang="ru-RU" dirty="0"/>
           </a:p>
         </p:txBody>
       </p:sp>
@@ -5731,14 +5770,7 @@
             </a:r>
             <a:r>
               <a:rPr lang="ru-RU" dirty="0"/>
-              <a:t>, в свою очередь, знает как строить гистограммы</a:t>
-            </a:r>
-          </a:p>
-          <a:p>
-            <a:pPr lvl="1"/>
-            <a:r>
-              <a:rPr lang="ru-RU" dirty="0"/>
-              <a:t>Обратите внимание, новый график отображается на новой фигуре</a:t>
+              <a:t>, в свою очередь, знает как строить графики, чем мы и займемся вскоре</a:t>
             </a:r>
           </a:p>
         </p:txBody>
@@ -5763,80 +5795,6 @@
         <p:txBody>
           <a:bodyPr/>
           <a:lstStyle/>
-          <a:p>
-            <a:r>
-              <a:rPr lang="en-US" dirty="0"/>
-              <a:t>fig = </a:t>
-            </a:r>
-            <a:r>
-              <a:rPr lang="en-US" dirty="0" err="1"/>
-              <a:t>plt.figure</a:t>
-            </a:r>
-            <a:r>
-              <a:rPr lang="en-US" dirty="0"/>
-              <a:t>()</a:t>
-            </a:r>
-          </a:p>
-          <a:p>
-            <a:r>
-              <a:rPr lang="en-US" dirty="0" err="1"/>
-              <a:t>plt.hist</a:t>
-            </a:r>
-            <a:r>
-              <a:rPr lang="en-US" dirty="0"/>
-              <a:t>(monts59)</a:t>
-            </a:r>
-          </a:p>
-          <a:p>
-            <a:r>
-              <a:rPr lang="en-US" dirty="0" err="1"/>
-              <a:t>plt.show</a:t>
-            </a:r>
-            <a:r>
-              <a:rPr lang="en-US" dirty="0"/>
-              <a:t>()</a:t>
-            </a:r>
-          </a:p>
-          <a:p>
-            <a:endParaRPr lang="en-US" dirty="0"/>
-          </a:p>
-          <a:p>
-            <a:r>
-              <a:rPr lang="en-US" dirty="0"/>
-              <a:t>fig = </a:t>
-            </a:r>
-            <a:r>
-              <a:rPr lang="en-US" dirty="0" err="1"/>
-              <a:t>plt.figure</a:t>
-            </a:r>
-            <a:r>
-              <a:rPr lang="en-US" dirty="0"/>
-              <a:t>()</a:t>
-            </a:r>
-          </a:p>
-          <a:p>
-            <a:r>
-              <a:rPr lang="en-US" dirty="0" err="1"/>
-              <a:t>plt.plot</a:t>
-            </a:r>
-            <a:r>
-              <a:rPr lang="en-US" dirty="0"/>
-              <a:t>(monts59)</a:t>
-            </a:r>
-          </a:p>
-          <a:p>
-            <a:r>
-              <a:rPr lang="en-US" dirty="0" err="1"/>
-              <a:t>plt.show</a:t>
-            </a:r>
-            <a:r>
-              <a:rPr lang="en-US" dirty="0"/>
-              <a:t>()</a:t>
-            </a:r>
-          </a:p>
-          <a:p>
-            <a:endParaRPr lang="en-US" dirty="0"/>
-          </a:p>
           <a:p>
             <a:r>
               <a:rPr lang="en-US" dirty="0"/>
@@ -5974,10 +5932,10 @@
       </p:grpSpPr>
       <p:sp>
         <p:nvSpPr>
-          <p:cNvPr id="5" name="Заголовок 4">
+          <p:cNvPr id="4" name="Заголовок 3">
             <a:extLst>
               <a:ext uri="{FF2B5EF4-FFF2-40B4-BE49-F238E27FC236}">
-                <a16:creationId xmlns:a16="http://schemas.microsoft.com/office/drawing/2014/main" id="{AE933930-6FDB-4D3A-B78D-BED7277292B8}"/>
+                <a16:creationId xmlns:a16="http://schemas.microsoft.com/office/drawing/2014/main" id="{056CD0ED-A937-4CCC-8AC5-B053FD13EEF1}"/>
               </a:ext>
             </a:extLst>
           </p:cNvPr>
@@ -5993,48 +5951,66 @@
           <a:bodyPr/>
           <a:lstStyle/>
           <a:p>
-            <a:endParaRPr lang="ru-RU"/>
-          </a:p>
-        </p:txBody>
-      </p:sp>
-      <p:pic>
-        <p:nvPicPr>
-          <p:cNvPr id="7" name="Объект 6">
+            <a:r>
+              <a:rPr lang="ru-RU" dirty="0"/>
+              <a:t>Самостоятельно</a:t>
+            </a:r>
+          </a:p>
+        </p:txBody>
+      </p:sp>
+      <p:sp>
+        <p:nvSpPr>
+          <p:cNvPr id="5" name="Текст 4">
             <a:extLst>
               <a:ext uri="{FF2B5EF4-FFF2-40B4-BE49-F238E27FC236}">
-                <a16:creationId xmlns:a16="http://schemas.microsoft.com/office/drawing/2014/main" id="{83049901-03D5-4109-84CA-53AF5CD15398}"/>
+                <a16:creationId xmlns:a16="http://schemas.microsoft.com/office/drawing/2014/main" id="{57E8AEAD-3147-4419-8FBC-8C20BDF850DA}"/>
               </a:ext>
             </a:extLst>
           </p:cNvPr>
-          <p:cNvPicPr>
-            <a:picLocks noGrp="1" noChangeAspect="1"/>
-          </p:cNvPicPr>
-          <p:nvPr>
-            <p:ph idx="1"/>
-          </p:nvPr>
-        </p:nvPicPr>
-        <p:blipFill>
-          <a:blip r:embed="rId2"/>
-          <a:stretch>
-            <a:fillRect/>
-          </a:stretch>
-        </p:blipFill>
-        <p:spPr>
-          <a:xfrm>
-            <a:off x="2290813" y="114113"/>
-            <a:ext cx="8797490" cy="6116139"/>
-          </a:xfrm>
-          <a:prstGeom prst="rect">
-            <a:avLst/>
-          </a:prstGeom>
-        </p:spPr>
-      </p:pic>
-      <p:sp>
-        <p:nvSpPr>
-          <p:cNvPr id="8" name="Номер слайда 7">
+          <p:cNvSpPr>
+            <a:spLocks noGrp="1"/>
+          </p:cNvSpPr>
+          <p:nvPr>
+            <p:ph type="body" idx="1"/>
+          </p:nvPr>
+        </p:nvSpPr>
+        <p:spPr/>
+        <p:txBody>
+          <a:bodyPr/>
+          <a:lstStyle/>
+          <a:p>
+            <a:r>
+              <a:rPr lang="ru-RU" dirty="0"/>
+              <a:t>Напечатайте в консоли те же характеристики, что и у </a:t>
+            </a:r>
+            <a:r>
+              <a:rPr lang="en-US" dirty="0" err="1"/>
+              <a:t>monts</a:t>
+            </a:r>
+            <a:endParaRPr lang="ru-RU" dirty="0"/>
+          </a:p>
+          <a:p>
+            <a:r>
+              <a:rPr lang="ru-RU" dirty="0"/>
+              <a:t>Для переменной </a:t>
+            </a:r>
+            <a:r>
+              <a:rPr lang="en-US" dirty="0"/>
+              <a:t>years</a:t>
+            </a:r>
+            <a:r>
+              <a:rPr lang="ru-RU" dirty="0"/>
+              <a:t> </a:t>
+            </a:r>
+          </a:p>
+        </p:txBody>
+      </p:sp>
+      <p:sp>
+        <p:nvSpPr>
+          <p:cNvPr id="6" name="Номер слайда 5">
             <a:extLst>
               <a:ext uri="{FF2B5EF4-FFF2-40B4-BE49-F238E27FC236}">
-                <a16:creationId xmlns:a16="http://schemas.microsoft.com/office/drawing/2014/main" id="{1639A7DB-52A7-4552-A7EB-C22F6530122E}"/>
+                <a16:creationId xmlns:a16="http://schemas.microsoft.com/office/drawing/2014/main" id="{8D3EEA73-E2D5-4CB6-B138-56A048247913}"/>
               </a:ext>
             </a:extLst>
           </p:cNvPr>
@@ -6062,7 +6038,7 @@
     </p:spTree>
     <p:extLst>
       <p:ext uri="{BB962C8B-B14F-4D97-AF65-F5344CB8AC3E}">
-        <p14:creationId xmlns:p14="http://schemas.microsoft.com/office/powerpoint/2010/main" val="1384893538"/>
+        <p14:creationId xmlns:p14="http://schemas.microsoft.com/office/powerpoint/2010/main" val="1368382647"/>
       </p:ext>
     </p:extLst>
   </p:cSld>
@@ -6091,10 +6067,10 @@
       </p:grpSpPr>
       <p:sp>
         <p:nvSpPr>
-          <p:cNvPr id="4" name="Заголовок 3">
+          <p:cNvPr id="2" name="Заголовок 1">
             <a:extLst>
               <a:ext uri="{FF2B5EF4-FFF2-40B4-BE49-F238E27FC236}">
-                <a16:creationId xmlns:a16="http://schemas.microsoft.com/office/drawing/2014/main" id="{056CD0ED-A937-4CCC-8AC5-B053FD13EEF1}"/>
+                <a16:creationId xmlns:a16="http://schemas.microsoft.com/office/drawing/2014/main" id="{B338E70A-43C0-4E48-8B63-D56B520F894D}"/>
               </a:ext>
             </a:extLst>
           </p:cNvPr>
@@ -6111,18 +6087,19 @@
           <a:lstStyle/>
           <a:p>
             <a:r>
-              <a:rPr lang="ru-RU" dirty="0"/>
-              <a:t>Самостоятельно</a:t>
-            </a:r>
-          </a:p>
-        </p:txBody>
-      </p:sp>
-      <p:sp>
-        <p:nvSpPr>
-          <p:cNvPr id="5" name="Текст 4">
+              <a:rPr lang="en-US" dirty="0"/>
+              <a:t>Stack  and Pivot</a:t>
+            </a:r>
+            <a:endParaRPr lang="ru-RU" dirty="0"/>
+          </a:p>
+        </p:txBody>
+      </p:sp>
+      <p:sp>
+        <p:nvSpPr>
+          <p:cNvPr id="3" name="Текст 2">
             <a:extLst>
               <a:ext uri="{FF2B5EF4-FFF2-40B4-BE49-F238E27FC236}">
-                <a16:creationId xmlns:a16="http://schemas.microsoft.com/office/drawing/2014/main" id="{57E8AEAD-3147-4419-8FBC-8C20BDF850DA}"/>
+                <a16:creationId xmlns:a16="http://schemas.microsoft.com/office/drawing/2014/main" id="{2FBBF41B-2F8A-44CA-8491-5CDA93D37157}"/>
               </a:ext>
             </a:extLst>
           </p:cNvPr>
@@ -6140,50 +6117,17 @@
           <a:p>
             <a:r>
               <a:rPr lang="ru-RU" dirty="0"/>
-              <a:t>Напечатайте график </a:t>
-            </a:r>
-            <a:r>
-              <a:rPr lang="en-US" dirty="0"/>
-              <a:t>box and whisker</a:t>
-            </a:r>
-            <a:endParaRPr lang="ru-RU" dirty="0"/>
-          </a:p>
-          <a:p>
-            <a:endParaRPr lang="ru-RU" dirty="0"/>
-          </a:p>
-          <a:p>
-            <a:r>
-              <a:rPr lang="ru-RU" dirty="0"/>
-              <a:t>Напечатайте в консоли те же характеристики, что и у </a:t>
-            </a:r>
-            <a:r>
-              <a:rPr lang="en-US" dirty="0" err="1"/>
-              <a:t>monts</a:t>
-            </a:r>
-            <a:endParaRPr lang="ru-RU" dirty="0"/>
-          </a:p>
-          <a:p>
-            <a:r>
-              <a:rPr lang="ru-RU" dirty="0"/>
-              <a:t>Для переменной </a:t>
-            </a:r>
-            <a:r>
-              <a:rPr lang="en-US" dirty="0"/>
-              <a:t>years</a:t>
-            </a:r>
-            <a:r>
-              <a:rPr lang="ru-RU" dirty="0"/>
-              <a:t> </a:t>
-            </a:r>
-          </a:p>
-        </p:txBody>
-      </p:sp>
-      <p:sp>
-        <p:nvSpPr>
-          <p:cNvPr id="6" name="Номер слайда 5">
+              <a:t>Таблицы с данными «в стопку» и «в колонки»</a:t>
+            </a:r>
+          </a:p>
+        </p:txBody>
+      </p:sp>
+      <p:sp>
+        <p:nvSpPr>
+          <p:cNvPr id="4" name="Номер слайда 3">
             <a:extLst>
               <a:ext uri="{FF2B5EF4-FFF2-40B4-BE49-F238E27FC236}">
-                <a16:creationId xmlns:a16="http://schemas.microsoft.com/office/drawing/2014/main" id="{8D3EEA73-E2D5-4CB6-B138-56A048247913}"/>
+                <a16:creationId xmlns:a16="http://schemas.microsoft.com/office/drawing/2014/main" id="{A5CFFFA2-548F-42C2-8C5B-902C98DB0EDE}"/>
               </a:ext>
             </a:extLst>
           </p:cNvPr>
@@ -6211,7 +6155,7 @@
     </p:spTree>
     <p:extLst>
       <p:ext uri="{BB962C8B-B14F-4D97-AF65-F5344CB8AC3E}">
-        <p14:creationId xmlns:p14="http://schemas.microsoft.com/office/powerpoint/2010/main" val="1368382647"/>
+        <p14:creationId xmlns:p14="http://schemas.microsoft.com/office/powerpoint/2010/main" val="2752730215"/>
       </p:ext>
     </p:extLst>
   </p:cSld>
@@ -6366,6 +6310,1637 @@
     <p:extLst>
       <p:ext uri="{BB962C8B-B14F-4D97-AF65-F5344CB8AC3E}">
         <p14:creationId xmlns:p14="http://schemas.microsoft.com/office/powerpoint/2010/main" val="470518044"/>
+      </p:ext>
+    </p:extLst>
+  </p:cSld>
+  <p:clrMapOvr>
+    <a:masterClrMapping/>
+  </p:clrMapOvr>
+</p:sld>
+</file>
+
+<file path=ppt/slides/slide20.xml><?xml version="1.0" encoding="utf-8"?>
+<p:sld xmlns:a="http://schemas.openxmlformats.org/drawingml/2006/main" xmlns:r="http://schemas.openxmlformats.org/officeDocument/2006/relationships" xmlns:p="http://schemas.openxmlformats.org/presentationml/2006/main">
+  <p:cSld>
+    <p:spTree>
+      <p:nvGrpSpPr>
+        <p:cNvPr id="1" name=""/>
+        <p:cNvGrpSpPr/>
+        <p:nvPr/>
+      </p:nvGrpSpPr>
+      <p:grpSpPr>
+        <a:xfrm>
+          <a:off x="0" y="0"/>
+          <a:ext cx="0" cy="0"/>
+          <a:chOff x="0" y="0"/>
+          <a:chExt cx="0" cy="0"/>
+        </a:xfrm>
+      </p:grpSpPr>
+      <p:sp>
+        <p:nvSpPr>
+          <p:cNvPr id="5" name="Заголовок 4">
+            <a:extLst>
+              <a:ext uri="{FF2B5EF4-FFF2-40B4-BE49-F238E27FC236}">
+                <a16:creationId xmlns:a16="http://schemas.microsoft.com/office/drawing/2014/main" id="{A4541642-8203-41EB-A08E-9F9D95A4B933}"/>
+              </a:ext>
+            </a:extLst>
+          </p:cNvPr>
+          <p:cNvSpPr>
+            <a:spLocks noGrp="1"/>
+          </p:cNvSpPr>
+          <p:nvPr>
+            <p:ph type="title"/>
+          </p:nvPr>
+        </p:nvSpPr>
+        <p:spPr/>
+        <p:txBody>
+          <a:bodyPr/>
+          <a:lstStyle/>
+          <a:p>
+            <a:endParaRPr lang="ru-RU"/>
+          </a:p>
+        </p:txBody>
+      </p:sp>
+      <p:sp>
+        <p:nvSpPr>
+          <p:cNvPr id="6" name="Объект 5">
+            <a:extLst>
+              <a:ext uri="{FF2B5EF4-FFF2-40B4-BE49-F238E27FC236}">
+                <a16:creationId xmlns:a16="http://schemas.microsoft.com/office/drawing/2014/main" id="{85B96D51-9CE7-43B1-AA16-4024E98A0425}"/>
+              </a:ext>
+            </a:extLst>
+          </p:cNvPr>
+          <p:cNvSpPr>
+            <a:spLocks noGrp="1"/>
+          </p:cNvSpPr>
+          <p:nvPr>
+            <p:ph idx="1"/>
+          </p:nvPr>
+        </p:nvSpPr>
+        <p:spPr/>
+        <p:txBody>
+          <a:bodyPr/>
+          <a:lstStyle/>
+          <a:p>
+            <a:r>
+              <a:rPr lang="ru-RU" dirty="0"/>
+              <a:t>Многие таблицы содержат данные в виде стека (стопки), например:</a:t>
+            </a:r>
+          </a:p>
+          <a:p>
+            <a:r>
+              <a:rPr lang="ru-RU" dirty="0"/>
+              <a:t>2019 </a:t>
+            </a:r>
+            <a:r>
+              <a:rPr lang="ru-RU" dirty="0" err="1"/>
+              <a:t>янв</a:t>
+            </a:r>
+            <a:r>
+              <a:rPr lang="ru-RU" dirty="0"/>
+              <a:t> 100</a:t>
+            </a:r>
+          </a:p>
+          <a:p>
+            <a:r>
+              <a:rPr lang="ru-RU" dirty="0"/>
+              <a:t>2019 </a:t>
+            </a:r>
+            <a:r>
+              <a:rPr lang="ru-RU" dirty="0" err="1"/>
+              <a:t>фев</a:t>
+            </a:r>
+            <a:r>
+              <a:rPr lang="ru-RU" dirty="0"/>
+              <a:t> 200</a:t>
+            </a:r>
+          </a:p>
+          <a:p>
+            <a:r>
+              <a:rPr lang="ru-RU" dirty="0"/>
+              <a:t>…</a:t>
+            </a:r>
+          </a:p>
+          <a:p>
+            <a:r>
+              <a:rPr lang="ru-RU" dirty="0"/>
+              <a:t>2022 ноя 140</a:t>
+            </a:r>
+          </a:p>
+          <a:p>
+            <a:r>
+              <a:rPr lang="ru-RU" dirty="0"/>
+              <a:t>2022 дек 160</a:t>
+            </a:r>
+          </a:p>
+          <a:p>
+            <a:r>
+              <a:rPr lang="ru-RU" dirty="0"/>
+              <a:t>Более логичным было бы сформировать из месяцев колонки:</a:t>
+            </a:r>
+          </a:p>
+          <a:p>
+            <a:r>
+              <a:rPr lang="ru-RU" dirty="0"/>
+              <a:t>             </a:t>
+            </a:r>
+            <a:r>
+              <a:rPr lang="ru-RU" dirty="0" err="1"/>
+              <a:t>янв</a:t>
+            </a:r>
+            <a:r>
+              <a:rPr lang="ru-RU" dirty="0"/>
+              <a:t> </a:t>
+            </a:r>
+            <a:r>
+              <a:rPr lang="ru-RU" dirty="0" err="1"/>
+              <a:t>фев</a:t>
+            </a:r>
+            <a:r>
+              <a:rPr lang="ru-RU" dirty="0"/>
+              <a:t> мар </a:t>
+            </a:r>
+            <a:r>
+              <a:rPr lang="ru-RU" dirty="0" err="1"/>
+              <a:t>апр</a:t>
+            </a:r>
+            <a:r>
+              <a:rPr lang="ru-RU" dirty="0"/>
+              <a:t> … дек</a:t>
+            </a:r>
+          </a:p>
+          <a:p>
+            <a:r>
+              <a:rPr lang="ru-RU" dirty="0"/>
+              <a:t>2019   100  200</a:t>
+            </a:r>
+          </a:p>
+          <a:p>
+            <a:r>
+              <a:rPr lang="ru-RU" dirty="0"/>
+              <a:t>2020</a:t>
+            </a:r>
+          </a:p>
+          <a:p>
+            <a:r>
+              <a:rPr lang="ru-RU" dirty="0"/>
+              <a:t>…</a:t>
+            </a:r>
+          </a:p>
+          <a:p>
+            <a:r>
+              <a:rPr lang="ru-RU" dirty="0"/>
+              <a:t>2022                                             160</a:t>
+            </a:r>
+          </a:p>
+          <a:p>
+            <a:r>
+              <a:rPr lang="ru-RU" dirty="0"/>
+              <a:t>Такая таблица называется сводной (</a:t>
+            </a:r>
+            <a:r>
+              <a:rPr lang="en-US" dirty="0"/>
+              <a:t>pivot)</a:t>
+            </a:r>
+            <a:endParaRPr lang="ru-RU" dirty="0"/>
+          </a:p>
+        </p:txBody>
+      </p:sp>
+      <p:sp>
+        <p:nvSpPr>
+          <p:cNvPr id="4" name="Номер слайда 3">
+            <a:extLst>
+              <a:ext uri="{FF2B5EF4-FFF2-40B4-BE49-F238E27FC236}">
+                <a16:creationId xmlns:a16="http://schemas.microsoft.com/office/drawing/2014/main" id="{1094060A-7B96-4319-9F3A-8EBCBA907263}"/>
+              </a:ext>
+            </a:extLst>
+          </p:cNvPr>
+          <p:cNvSpPr>
+            <a:spLocks noGrp="1"/>
+          </p:cNvSpPr>
+          <p:nvPr>
+            <p:ph type="sldNum" sz="quarter" idx="12"/>
+          </p:nvPr>
+        </p:nvSpPr>
+        <p:spPr/>
+        <p:txBody>
+          <a:bodyPr/>
+          <a:lstStyle/>
+          <a:p>
+            <a:fld id="{4FAB73BC-B049-4115-A692-8D63A059BFB8}" type="slidenum">
+              <a:rPr lang="en-US" smtClean="0"/>
+              <a:pPr/>
+              <a:t>20</a:t>
+            </a:fld>
+            <a:endParaRPr lang="en-US" dirty="0"/>
+          </a:p>
+        </p:txBody>
+      </p:sp>
+    </p:spTree>
+    <p:extLst>
+      <p:ext uri="{BB962C8B-B14F-4D97-AF65-F5344CB8AC3E}">
+        <p14:creationId xmlns:p14="http://schemas.microsoft.com/office/powerpoint/2010/main" val="3173931105"/>
+      </p:ext>
+    </p:extLst>
+  </p:cSld>
+  <p:clrMapOvr>
+    <a:masterClrMapping/>
+  </p:clrMapOvr>
+</p:sld>
+</file>
+
+<file path=ppt/slides/slide21.xml><?xml version="1.0" encoding="utf-8"?>
+<p:sld xmlns:a="http://schemas.openxmlformats.org/drawingml/2006/main" xmlns:r="http://schemas.openxmlformats.org/officeDocument/2006/relationships" xmlns:p="http://schemas.openxmlformats.org/presentationml/2006/main">
+  <p:cSld>
+    <p:spTree>
+      <p:nvGrpSpPr>
+        <p:cNvPr id="1" name=""/>
+        <p:cNvGrpSpPr/>
+        <p:nvPr/>
+      </p:nvGrpSpPr>
+      <p:grpSpPr>
+        <a:xfrm>
+          <a:off x="0" y="0"/>
+          <a:ext cx="0" cy="0"/>
+          <a:chOff x="0" y="0"/>
+          <a:chExt cx="0" cy="0"/>
+        </a:xfrm>
+      </p:grpSpPr>
+      <p:sp>
+        <p:nvSpPr>
+          <p:cNvPr id="2" name="Заголовок 1">
+            <a:extLst>
+              <a:ext uri="{FF2B5EF4-FFF2-40B4-BE49-F238E27FC236}">
+                <a16:creationId xmlns:a16="http://schemas.microsoft.com/office/drawing/2014/main" id="{66144EC9-C606-448E-A5AE-26AE1933EC44}"/>
+              </a:ext>
+            </a:extLst>
+          </p:cNvPr>
+          <p:cNvSpPr>
+            <a:spLocks noGrp="1"/>
+          </p:cNvSpPr>
+          <p:nvPr>
+            <p:ph type="title"/>
+          </p:nvPr>
+        </p:nvSpPr>
+        <p:spPr/>
+        <p:txBody>
+          <a:bodyPr/>
+          <a:lstStyle/>
+          <a:p>
+            <a:endParaRPr lang="ru-RU"/>
+          </a:p>
+        </p:txBody>
+      </p:sp>
+      <p:sp>
+        <p:nvSpPr>
+          <p:cNvPr id="3" name="Объект 2">
+            <a:extLst>
+              <a:ext uri="{FF2B5EF4-FFF2-40B4-BE49-F238E27FC236}">
+                <a16:creationId xmlns:a16="http://schemas.microsoft.com/office/drawing/2014/main" id="{6F5D83FC-7725-4A8C-A51D-C36DF87AFFB4}"/>
+              </a:ext>
+            </a:extLst>
+          </p:cNvPr>
+          <p:cNvSpPr>
+            <a:spLocks noGrp="1"/>
+          </p:cNvSpPr>
+          <p:nvPr>
+            <p:ph idx="1"/>
+          </p:nvPr>
+        </p:nvSpPr>
+        <p:spPr/>
+        <p:txBody>
+          <a:bodyPr/>
+          <a:lstStyle/>
+          <a:p>
+            <a:r>
+              <a:rPr lang="ru-RU" dirty="0"/>
+              <a:t>В нашем случае в таблице смертность по годам и </a:t>
+            </a:r>
+            <a:r>
+              <a:rPr lang="ru-RU" dirty="0" err="1"/>
+              <a:t>регшионам</a:t>
+            </a:r>
+            <a:r>
+              <a:rPr lang="ru-RU" dirty="0"/>
+              <a:t>.</a:t>
+            </a:r>
+          </a:p>
+          <a:p>
+            <a:r>
+              <a:rPr lang="ru-RU" dirty="0"/>
+              <a:t>Логично, например, сделать таблицу годы*регионы</a:t>
+            </a:r>
+          </a:p>
+          <a:p>
+            <a:r>
+              <a:rPr lang="ru-RU" dirty="0"/>
+              <a:t>В </a:t>
+            </a:r>
+            <a:r>
+              <a:rPr lang="en-US" dirty="0"/>
+              <a:t>pandas</a:t>
+            </a:r>
+            <a:r>
+              <a:rPr lang="ru-RU" dirty="0"/>
+              <a:t> за это отвечает функция </a:t>
+            </a:r>
+            <a:r>
+              <a:rPr lang="en-US" dirty="0"/>
+              <a:t>pivot </a:t>
+            </a:r>
+            <a:r>
+              <a:rPr lang="ru-RU" dirty="0"/>
+              <a:t>и аналогичная ей </a:t>
+            </a:r>
+            <a:r>
+              <a:rPr lang="en-US" dirty="0"/>
+              <a:t>pivot</a:t>
+            </a:r>
+            <a:r>
+              <a:rPr lang="ru-RU" dirty="0"/>
+              <a:t>_</a:t>
+            </a:r>
+            <a:r>
+              <a:rPr lang="en-US" dirty="0"/>
+              <a:t>table</a:t>
+            </a:r>
+          </a:p>
+          <a:p>
+            <a:r>
+              <a:rPr lang="ru-RU" dirty="0"/>
+              <a:t>Обоим функциям надо указать, какая колонка является источником данных по вертикали, а какая – источником для названий колонок</a:t>
+            </a:r>
+          </a:p>
+          <a:p>
+            <a:r>
+              <a:rPr lang="ru-RU" dirty="0"/>
+              <a:t>Можно задать как имена колонок, так и их номера, начиная с номера «0»</a:t>
+            </a:r>
+          </a:p>
+          <a:p>
+            <a:pPr lvl="1"/>
+            <a:r>
+              <a:rPr lang="en-US" dirty="0"/>
+              <a:t>pivot = </a:t>
+            </a:r>
+            <a:r>
+              <a:rPr lang="en-US" dirty="0" err="1"/>
+              <a:t>df.pivot</a:t>
+            </a:r>
+            <a:r>
+              <a:rPr lang="en-US" dirty="0"/>
+              <a:t>(index='</a:t>
+            </a:r>
+            <a:r>
+              <a:rPr lang="en-US" dirty="0" err="1"/>
+              <a:t>Year',columns</a:t>
+            </a:r>
+            <a:r>
+              <a:rPr lang="en-US" dirty="0"/>
+              <a:t>='</a:t>
+            </a:r>
+            <a:r>
+              <a:rPr lang="en-US" dirty="0" err="1"/>
+              <a:t>Region',values</a:t>
+            </a:r>
+            <a:r>
+              <a:rPr lang="en-US" dirty="0"/>
+              <a:t>=' 1-59 months’)</a:t>
+            </a:r>
+            <a:endParaRPr lang="ru-RU" dirty="0"/>
+          </a:p>
+          <a:p>
+            <a:r>
+              <a:rPr lang="ru-RU" dirty="0"/>
+              <a:t>Здесь по вертикали будут года, в колонках – имена регионов, переменными станут данные о смертности за срок 1-59 месяцев</a:t>
+            </a:r>
+          </a:p>
+          <a:p>
+            <a:r>
+              <a:rPr lang="ru-RU" dirty="0"/>
+              <a:t>В результате будет сформирован новый </a:t>
+            </a:r>
+            <a:r>
+              <a:rPr lang="en-US" dirty="0" err="1"/>
+              <a:t>dataframe</a:t>
+            </a:r>
+            <a:r>
+              <a:rPr lang="ru-RU" dirty="0"/>
+              <a:t> - </a:t>
+            </a:r>
+            <a:r>
+              <a:rPr lang="en-US" dirty="0"/>
+              <a:t>pivot</a:t>
+            </a:r>
+            <a:endParaRPr lang="ru-RU" dirty="0"/>
+          </a:p>
+        </p:txBody>
+      </p:sp>
+      <p:sp>
+        <p:nvSpPr>
+          <p:cNvPr id="4" name="Номер слайда 3">
+            <a:extLst>
+              <a:ext uri="{FF2B5EF4-FFF2-40B4-BE49-F238E27FC236}">
+                <a16:creationId xmlns:a16="http://schemas.microsoft.com/office/drawing/2014/main" id="{61687F32-A78C-4EB7-8C03-90B158F648C8}"/>
+              </a:ext>
+            </a:extLst>
+          </p:cNvPr>
+          <p:cNvSpPr>
+            <a:spLocks noGrp="1"/>
+          </p:cNvSpPr>
+          <p:nvPr>
+            <p:ph type="sldNum" sz="quarter" idx="12"/>
+          </p:nvPr>
+        </p:nvSpPr>
+        <p:spPr/>
+        <p:txBody>
+          <a:bodyPr/>
+          <a:lstStyle/>
+          <a:p>
+            <a:fld id="{4FAB73BC-B049-4115-A692-8D63A059BFB8}" type="slidenum">
+              <a:rPr lang="en-US" smtClean="0"/>
+              <a:pPr/>
+              <a:t>21</a:t>
+            </a:fld>
+            <a:endParaRPr lang="en-US" dirty="0"/>
+          </a:p>
+        </p:txBody>
+      </p:sp>
+    </p:spTree>
+    <p:extLst>
+      <p:ext uri="{BB962C8B-B14F-4D97-AF65-F5344CB8AC3E}">
+        <p14:creationId xmlns:p14="http://schemas.microsoft.com/office/powerpoint/2010/main" val="1236813239"/>
+      </p:ext>
+    </p:extLst>
+  </p:cSld>
+  <p:clrMapOvr>
+    <a:masterClrMapping/>
+  </p:clrMapOvr>
+</p:sld>
+</file>
+
+<file path=ppt/slides/slide22.xml><?xml version="1.0" encoding="utf-8"?>
+<p:sld xmlns:a="http://schemas.openxmlformats.org/drawingml/2006/main" xmlns:r="http://schemas.openxmlformats.org/officeDocument/2006/relationships" xmlns:p="http://schemas.openxmlformats.org/presentationml/2006/main">
+  <p:cSld>
+    <p:spTree>
+      <p:nvGrpSpPr>
+        <p:cNvPr id="1" name=""/>
+        <p:cNvGrpSpPr/>
+        <p:nvPr/>
+      </p:nvGrpSpPr>
+      <p:grpSpPr>
+        <a:xfrm>
+          <a:off x="0" y="0"/>
+          <a:ext cx="0" cy="0"/>
+          <a:chOff x="0" y="0"/>
+          <a:chExt cx="0" cy="0"/>
+        </a:xfrm>
+      </p:grpSpPr>
+      <p:sp>
+        <p:nvSpPr>
+          <p:cNvPr id="2" name="Заголовок 1">
+            <a:extLst>
+              <a:ext uri="{FF2B5EF4-FFF2-40B4-BE49-F238E27FC236}">
+                <a16:creationId xmlns:a16="http://schemas.microsoft.com/office/drawing/2014/main" id="{2AB428A1-2265-40A6-99B4-1651F64CF4BB}"/>
+              </a:ext>
+            </a:extLst>
+          </p:cNvPr>
+          <p:cNvSpPr>
+            <a:spLocks noGrp="1"/>
+          </p:cNvSpPr>
+          <p:nvPr>
+            <p:ph type="title"/>
+          </p:nvPr>
+        </p:nvSpPr>
+        <p:spPr/>
+        <p:txBody>
+          <a:bodyPr/>
+          <a:lstStyle/>
+          <a:p>
+            <a:endParaRPr lang="ru-RU"/>
+          </a:p>
+        </p:txBody>
+      </p:sp>
+      <p:pic>
+        <p:nvPicPr>
+          <p:cNvPr id="5" name="Объект 4">
+            <a:extLst>
+              <a:ext uri="{FF2B5EF4-FFF2-40B4-BE49-F238E27FC236}">
+                <a16:creationId xmlns:a16="http://schemas.microsoft.com/office/drawing/2014/main" id="{8C283B83-2F8C-4B28-9E6F-FCB346CF60B1}"/>
+              </a:ext>
+            </a:extLst>
+          </p:cNvPr>
+          <p:cNvPicPr>
+            <a:picLocks noGrp="1" noChangeAspect="1"/>
+          </p:cNvPicPr>
+          <p:nvPr>
+            <p:ph idx="1"/>
+          </p:nvPr>
+        </p:nvPicPr>
+        <p:blipFill>
+          <a:blip r:embed="rId2"/>
+          <a:stretch>
+            <a:fillRect/>
+          </a:stretch>
+        </p:blipFill>
+        <p:spPr>
+          <a:xfrm>
+            <a:off x="1737099" y="2863094"/>
+            <a:ext cx="10031709" cy="1122309"/>
+          </a:xfrm>
+          <a:prstGeom prst="rect">
+            <a:avLst/>
+          </a:prstGeom>
+        </p:spPr>
+      </p:pic>
+      <p:sp>
+        <p:nvSpPr>
+          <p:cNvPr id="4" name="Номер слайда 3">
+            <a:extLst>
+              <a:ext uri="{FF2B5EF4-FFF2-40B4-BE49-F238E27FC236}">
+                <a16:creationId xmlns:a16="http://schemas.microsoft.com/office/drawing/2014/main" id="{1EB09785-813B-4037-BDC4-262461972A39}"/>
+              </a:ext>
+            </a:extLst>
+          </p:cNvPr>
+          <p:cNvSpPr>
+            <a:spLocks noGrp="1"/>
+          </p:cNvSpPr>
+          <p:nvPr>
+            <p:ph type="sldNum" sz="quarter" idx="12"/>
+          </p:nvPr>
+        </p:nvSpPr>
+        <p:spPr/>
+        <p:txBody>
+          <a:bodyPr/>
+          <a:lstStyle/>
+          <a:p>
+            <a:fld id="{4FAB73BC-B049-4115-A692-8D63A059BFB8}" type="slidenum">
+              <a:rPr lang="en-US" smtClean="0"/>
+              <a:pPr/>
+              <a:t>22</a:t>
+            </a:fld>
+            <a:endParaRPr lang="en-US" dirty="0"/>
+          </a:p>
+        </p:txBody>
+      </p:sp>
+    </p:spTree>
+    <p:extLst>
+      <p:ext uri="{BB962C8B-B14F-4D97-AF65-F5344CB8AC3E}">
+        <p14:creationId xmlns:p14="http://schemas.microsoft.com/office/powerpoint/2010/main" val="2282987957"/>
+      </p:ext>
+    </p:extLst>
+  </p:cSld>
+  <p:clrMapOvr>
+    <a:masterClrMapping/>
+  </p:clrMapOvr>
+</p:sld>
+</file>
+
+<file path=ppt/slides/slide23.xml><?xml version="1.0" encoding="utf-8"?>
+<p:sld xmlns:a="http://schemas.openxmlformats.org/drawingml/2006/main" xmlns:r="http://schemas.openxmlformats.org/officeDocument/2006/relationships" xmlns:p="http://schemas.openxmlformats.org/presentationml/2006/main">
+  <p:cSld>
+    <p:spTree>
+      <p:nvGrpSpPr>
+        <p:cNvPr id="1" name=""/>
+        <p:cNvGrpSpPr/>
+        <p:nvPr/>
+      </p:nvGrpSpPr>
+      <p:grpSpPr>
+        <a:xfrm>
+          <a:off x="0" y="0"/>
+          <a:ext cx="0" cy="0"/>
+          <a:chOff x="0" y="0"/>
+          <a:chExt cx="0" cy="0"/>
+        </a:xfrm>
+      </p:grpSpPr>
+      <p:sp>
+        <p:nvSpPr>
+          <p:cNvPr id="2" name="Заголовок 1">
+            <a:extLst>
+              <a:ext uri="{FF2B5EF4-FFF2-40B4-BE49-F238E27FC236}">
+                <a16:creationId xmlns:a16="http://schemas.microsoft.com/office/drawing/2014/main" id="{93F70858-29C2-4136-BFC9-C4517D2F62F6}"/>
+              </a:ext>
+            </a:extLst>
+          </p:cNvPr>
+          <p:cNvSpPr>
+            <a:spLocks noGrp="1"/>
+          </p:cNvSpPr>
+          <p:nvPr>
+            <p:ph type="title"/>
+          </p:nvPr>
+        </p:nvSpPr>
+        <p:spPr/>
+        <p:txBody>
+          <a:bodyPr/>
+          <a:lstStyle/>
+          <a:p>
+            <a:endParaRPr lang="ru-RU"/>
+          </a:p>
+        </p:txBody>
+      </p:sp>
+      <p:sp>
+        <p:nvSpPr>
+          <p:cNvPr id="3" name="Объект 2">
+            <a:extLst>
+              <a:ext uri="{FF2B5EF4-FFF2-40B4-BE49-F238E27FC236}">
+                <a16:creationId xmlns:a16="http://schemas.microsoft.com/office/drawing/2014/main" id="{162C603F-798F-4352-B70C-CB0B54786B5C}"/>
+              </a:ext>
+            </a:extLst>
+          </p:cNvPr>
+          <p:cNvSpPr>
+            <a:spLocks noGrp="1"/>
+          </p:cNvSpPr>
+          <p:nvPr>
+            <p:ph idx="1"/>
+          </p:nvPr>
+        </p:nvSpPr>
+        <p:spPr/>
+        <p:txBody>
+          <a:bodyPr/>
+          <a:lstStyle/>
+          <a:p>
+            <a:r>
+              <a:rPr lang="ru-RU" dirty="0"/>
+              <a:t>Полученную таким образом структуру можно изобразить в виде столбчатой диаграммы:</a:t>
+            </a:r>
+          </a:p>
+          <a:p>
+            <a:r>
+              <a:rPr lang="ru-RU" dirty="0"/>
+              <a:t>Вывод на печать графика первой (с номером «0») серии</a:t>
+            </a:r>
+          </a:p>
+          <a:p>
+            <a:pPr lvl="1"/>
+            <a:r>
+              <a:rPr lang="en-US" dirty="0" err="1"/>
+              <a:t>pivot.plot.bar</a:t>
+            </a:r>
+            <a:r>
+              <a:rPr lang="en-US" dirty="0"/>
+              <a:t>(y=[0])</a:t>
+            </a:r>
+          </a:p>
+          <a:p>
+            <a:pPr lvl="1"/>
+            <a:r>
+              <a:rPr lang="en-US" dirty="0" err="1"/>
+              <a:t>plt.show</a:t>
+            </a:r>
+            <a:r>
+              <a:rPr lang="en-US" dirty="0"/>
+              <a:t>()</a:t>
+            </a:r>
+            <a:endParaRPr lang="ru-RU" dirty="0"/>
+          </a:p>
+          <a:p>
+            <a:r>
+              <a:rPr lang="ru-RU" dirty="0"/>
+              <a:t>Вывод второй серии</a:t>
+            </a:r>
+            <a:endParaRPr lang="en-US" dirty="0"/>
+          </a:p>
+          <a:p>
+            <a:pPr lvl="1"/>
+            <a:r>
+              <a:rPr lang="en-US" dirty="0"/>
+              <a:t>fig2 = </a:t>
+            </a:r>
+            <a:r>
+              <a:rPr lang="en-US" dirty="0" err="1"/>
+              <a:t>pivot.plot.bar</a:t>
+            </a:r>
+            <a:r>
+              <a:rPr lang="en-US" dirty="0"/>
+              <a:t>(y=[1])</a:t>
+            </a:r>
+          </a:p>
+          <a:p>
+            <a:pPr lvl="1"/>
+            <a:r>
+              <a:rPr lang="en-US" dirty="0" err="1"/>
+              <a:t>plt.show</a:t>
+            </a:r>
+            <a:r>
+              <a:rPr lang="en-US" dirty="0"/>
+              <a:t>()</a:t>
+            </a:r>
+            <a:endParaRPr lang="ru-RU" dirty="0"/>
+          </a:p>
+          <a:p>
+            <a:r>
+              <a:rPr lang="ru-RU" dirty="0"/>
+              <a:t>Вывод сразу нескольких серий</a:t>
+            </a:r>
+            <a:endParaRPr lang="en-US" dirty="0"/>
+          </a:p>
+          <a:p>
+            <a:pPr lvl="1"/>
+            <a:r>
+              <a:rPr lang="en-US" dirty="0"/>
+              <a:t>fig3 = </a:t>
+            </a:r>
+            <a:r>
+              <a:rPr lang="en-US" dirty="0" err="1"/>
+              <a:t>pivot.plot.bar</a:t>
+            </a:r>
+            <a:r>
+              <a:rPr lang="en-US" dirty="0"/>
+              <a:t>(y=[2,3,4,5])</a:t>
+            </a:r>
+            <a:endParaRPr lang="ru-RU" dirty="0"/>
+          </a:p>
+          <a:p>
+            <a:pPr lvl="1"/>
+            <a:r>
+              <a:rPr lang="en-US" dirty="0" err="1"/>
+              <a:t>plt.show</a:t>
+            </a:r>
+            <a:r>
+              <a:rPr lang="en-US" dirty="0"/>
+              <a:t>()</a:t>
+            </a:r>
+            <a:endParaRPr lang="ru-RU" dirty="0"/>
+          </a:p>
+          <a:p>
+            <a:r>
+              <a:rPr lang="ru-RU" dirty="0"/>
+              <a:t>Обратите внимание: все серии автоматически получили «правильные» названия – имена регионов</a:t>
+            </a:r>
+          </a:p>
+        </p:txBody>
+      </p:sp>
+      <p:sp>
+        <p:nvSpPr>
+          <p:cNvPr id="4" name="Номер слайда 3">
+            <a:extLst>
+              <a:ext uri="{FF2B5EF4-FFF2-40B4-BE49-F238E27FC236}">
+                <a16:creationId xmlns:a16="http://schemas.microsoft.com/office/drawing/2014/main" id="{52531FC1-6217-479F-A333-8E2955192622}"/>
+              </a:ext>
+            </a:extLst>
+          </p:cNvPr>
+          <p:cNvSpPr>
+            <a:spLocks noGrp="1"/>
+          </p:cNvSpPr>
+          <p:nvPr>
+            <p:ph type="sldNum" sz="quarter" idx="12"/>
+          </p:nvPr>
+        </p:nvSpPr>
+        <p:spPr/>
+        <p:txBody>
+          <a:bodyPr/>
+          <a:lstStyle/>
+          <a:p>
+            <a:fld id="{4FAB73BC-B049-4115-A692-8D63A059BFB8}" type="slidenum">
+              <a:rPr lang="en-US" smtClean="0"/>
+              <a:pPr/>
+              <a:t>23</a:t>
+            </a:fld>
+            <a:endParaRPr lang="en-US" dirty="0"/>
+          </a:p>
+        </p:txBody>
+      </p:sp>
+    </p:spTree>
+    <p:extLst>
+      <p:ext uri="{BB962C8B-B14F-4D97-AF65-F5344CB8AC3E}">
+        <p14:creationId xmlns:p14="http://schemas.microsoft.com/office/powerpoint/2010/main" val="2000710236"/>
+      </p:ext>
+    </p:extLst>
+  </p:cSld>
+  <p:clrMapOvr>
+    <a:masterClrMapping/>
+  </p:clrMapOvr>
+</p:sld>
+</file>
+
+<file path=ppt/slides/slide24.xml><?xml version="1.0" encoding="utf-8"?>
+<p:sld xmlns:a="http://schemas.openxmlformats.org/drawingml/2006/main" xmlns:r="http://schemas.openxmlformats.org/officeDocument/2006/relationships" xmlns:p="http://schemas.openxmlformats.org/presentationml/2006/main">
+  <p:cSld>
+    <p:spTree>
+      <p:nvGrpSpPr>
+        <p:cNvPr id="1" name=""/>
+        <p:cNvGrpSpPr/>
+        <p:nvPr/>
+      </p:nvGrpSpPr>
+      <p:grpSpPr>
+        <a:xfrm>
+          <a:off x="0" y="0"/>
+          <a:ext cx="0" cy="0"/>
+          <a:chOff x="0" y="0"/>
+          <a:chExt cx="0" cy="0"/>
+        </a:xfrm>
+      </p:grpSpPr>
+      <p:sp>
+        <p:nvSpPr>
+          <p:cNvPr id="5" name="Заголовок 4">
+            <a:extLst>
+              <a:ext uri="{FF2B5EF4-FFF2-40B4-BE49-F238E27FC236}">
+                <a16:creationId xmlns:a16="http://schemas.microsoft.com/office/drawing/2014/main" id="{FF0AF550-3000-4096-AC6B-CEDA70FB3D88}"/>
+              </a:ext>
+            </a:extLst>
+          </p:cNvPr>
+          <p:cNvSpPr>
+            <a:spLocks noGrp="1"/>
+          </p:cNvSpPr>
+          <p:nvPr>
+            <p:ph type="title"/>
+          </p:nvPr>
+        </p:nvSpPr>
+        <p:spPr/>
+        <p:txBody>
+          <a:bodyPr/>
+          <a:lstStyle/>
+          <a:p>
+            <a:r>
+              <a:rPr lang="ru-RU" dirty="0"/>
+              <a:t>Несколько графиков (примеры)</a:t>
+            </a:r>
+          </a:p>
+        </p:txBody>
+      </p:sp>
+      <p:pic>
+        <p:nvPicPr>
+          <p:cNvPr id="9" name="Объект 8">
+            <a:extLst>
+              <a:ext uri="{FF2B5EF4-FFF2-40B4-BE49-F238E27FC236}">
+                <a16:creationId xmlns:a16="http://schemas.microsoft.com/office/drawing/2014/main" id="{E9E685CD-15A7-463A-AE3E-3944D287CE5E}"/>
+              </a:ext>
+            </a:extLst>
+          </p:cNvPr>
+          <p:cNvPicPr>
+            <a:picLocks noGrp="1" noChangeAspect="1"/>
+          </p:cNvPicPr>
+          <p:nvPr>
+            <p:ph idx="1"/>
+          </p:nvPr>
+        </p:nvPicPr>
+        <p:blipFill>
+          <a:blip r:embed="rId2"/>
+          <a:stretch>
+            <a:fillRect/>
+          </a:stretch>
+        </p:blipFill>
+        <p:spPr>
+          <a:xfrm>
+            <a:off x="3621236" y="136525"/>
+            <a:ext cx="4389967" cy="3292475"/>
+          </a:xfrm>
+          <a:prstGeom prst="rect">
+            <a:avLst/>
+          </a:prstGeom>
+          <a:ln>
+            <a:noFill/>
+          </a:ln>
+          <a:effectLst>
+            <a:outerShdw blurRad="190500" algn="tl" rotWithShape="0">
+              <a:srgbClr val="000000">
+                <a:alpha val="70000"/>
+              </a:srgbClr>
+            </a:outerShdw>
+          </a:effectLst>
+        </p:spPr>
+      </p:pic>
+      <p:pic>
+        <p:nvPicPr>
+          <p:cNvPr id="8" name="Рисунок 7">
+            <a:extLst>
+              <a:ext uri="{FF2B5EF4-FFF2-40B4-BE49-F238E27FC236}">
+                <a16:creationId xmlns:a16="http://schemas.microsoft.com/office/drawing/2014/main" id="{EF71F678-AE10-4BD3-A267-A452B63FF8EF}"/>
+              </a:ext>
+            </a:extLst>
+          </p:cNvPr>
+          <p:cNvPicPr>
+            <a:picLocks noChangeAspect="1"/>
+          </p:cNvPicPr>
+          <p:nvPr/>
+        </p:nvPicPr>
+        <p:blipFill>
+          <a:blip r:embed="rId3"/>
+          <a:stretch>
+            <a:fillRect/>
+          </a:stretch>
+        </p:blipFill>
+        <p:spPr>
+          <a:xfrm>
+            <a:off x="262464" y="3648009"/>
+            <a:ext cx="4933333" cy="2247619"/>
+          </a:xfrm>
+          <a:prstGeom prst="rect">
+            <a:avLst/>
+          </a:prstGeom>
+        </p:spPr>
+      </p:pic>
+      <p:sp>
+        <p:nvSpPr>
+          <p:cNvPr id="7" name="Текст 6">
+            <a:extLst>
+              <a:ext uri="{FF2B5EF4-FFF2-40B4-BE49-F238E27FC236}">
+                <a16:creationId xmlns:a16="http://schemas.microsoft.com/office/drawing/2014/main" id="{F73BBC8E-937C-4D55-B136-8468B97A9BA5}"/>
+              </a:ext>
+            </a:extLst>
+          </p:cNvPr>
+          <p:cNvSpPr>
+            <a:spLocks noGrp="1"/>
+          </p:cNvSpPr>
+          <p:nvPr>
+            <p:ph type="body" sz="half" idx="2"/>
+          </p:nvPr>
+        </p:nvSpPr>
+        <p:spPr/>
+        <p:txBody>
+          <a:bodyPr/>
+          <a:lstStyle/>
+          <a:p>
+            <a:endParaRPr lang="ru-RU"/>
+          </a:p>
+        </p:txBody>
+      </p:sp>
+      <p:sp>
+        <p:nvSpPr>
+          <p:cNvPr id="4" name="Номер слайда 3">
+            <a:extLst>
+              <a:ext uri="{FF2B5EF4-FFF2-40B4-BE49-F238E27FC236}">
+                <a16:creationId xmlns:a16="http://schemas.microsoft.com/office/drawing/2014/main" id="{97FFFFD9-332A-4E20-A5C1-9F4648127D6F}"/>
+              </a:ext>
+            </a:extLst>
+          </p:cNvPr>
+          <p:cNvSpPr>
+            <a:spLocks noGrp="1"/>
+          </p:cNvSpPr>
+          <p:nvPr>
+            <p:ph type="sldNum" sz="quarter" idx="12"/>
+          </p:nvPr>
+        </p:nvSpPr>
+        <p:spPr/>
+        <p:txBody>
+          <a:bodyPr/>
+          <a:lstStyle/>
+          <a:p>
+            <a:fld id="{4FAB73BC-B049-4115-A692-8D63A059BFB8}" type="slidenum">
+              <a:rPr lang="en-US" smtClean="0"/>
+              <a:pPr/>
+              <a:t>24</a:t>
+            </a:fld>
+            <a:endParaRPr lang="en-US" dirty="0"/>
+          </a:p>
+        </p:txBody>
+      </p:sp>
+      <p:pic>
+        <p:nvPicPr>
+          <p:cNvPr id="10" name="Рисунок 9">
+            <a:extLst>
+              <a:ext uri="{FF2B5EF4-FFF2-40B4-BE49-F238E27FC236}">
+                <a16:creationId xmlns:a16="http://schemas.microsoft.com/office/drawing/2014/main" id="{EDD017C5-1E0A-426D-99CC-CD9E85E71B57}"/>
+              </a:ext>
+            </a:extLst>
+          </p:cNvPr>
+          <p:cNvPicPr>
+            <a:picLocks noChangeAspect="1"/>
+          </p:cNvPicPr>
+          <p:nvPr/>
+        </p:nvPicPr>
+        <p:blipFill>
+          <a:blip r:embed="rId4"/>
+          <a:stretch>
+            <a:fillRect/>
+          </a:stretch>
+        </p:blipFill>
+        <p:spPr>
+          <a:xfrm>
+            <a:off x="7276536" y="533340"/>
+            <a:ext cx="4389967" cy="3292475"/>
+          </a:xfrm>
+          <a:prstGeom prst="rect">
+            <a:avLst/>
+          </a:prstGeom>
+          <a:ln>
+            <a:noFill/>
+          </a:ln>
+          <a:effectLst>
+            <a:outerShdw blurRad="190500" algn="tl" rotWithShape="0">
+              <a:srgbClr val="000000">
+                <a:alpha val="70000"/>
+              </a:srgbClr>
+            </a:outerShdw>
+          </a:effectLst>
+        </p:spPr>
+      </p:pic>
+      <p:pic>
+        <p:nvPicPr>
+          <p:cNvPr id="11" name="Рисунок 10">
+            <a:extLst>
+              <a:ext uri="{FF2B5EF4-FFF2-40B4-BE49-F238E27FC236}">
+                <a16:creationId xmlns:a16="http://schemas.microsoft.com/office/drawing/2014/main" id="{9C1C6CDF-4030-40F6-AE1A-EE5B5B879C3D}"/>
+              </a:ext>
+            </a:extLst>
+          </p:cNvPr>
+          <p:cNvPicPr>
+            <a:picLocks noChangeAspect="1"/>
+          </p:cNvPicPr>
+          <p:nvPr/>
+        </p:nvPicPr>
+        <p:blipFill>
+          <a:blip r:embed="rId5"/>
+          <a:stretch>
+            <a:fillRect/>
+          </a:stretch>
+        </p:blipFill>
+        <p:spPr>
+          <a:xfrm>
+            <a:off x="3985048" y="3470825"/>
+            <a:ext cx="4389967" cy="3292475"/>
+          </a:xfrm>
+          <a:prstGeom prst="rect">
+            <a:avLst/>
+          </a:prstGeom>
+          <a:ln>
+            <a:noFill/>
+          </a:ln>
+          <a:effectLst>
+            <a:outerShdw blurRad="190500" algn="tl" rotWithShape="0">
+              <a:srgbClr val="000000">
+                <a:alpha val="70000"/>
+              </a:srgbClr>
+            </a:outerShdw>
+          </a:effectLst>
+        </p:spPr>
+      </p:pic>
+      <p:pic>
+        <p:nvPicPr>
+          <p:cNvPr id="12" name="Рисунок 11">
+            <a:extLst>
+              <a:ext uri="{FF2B5EF4-FFF2-40B4-BE49-F238E27FC236}">
+                <a16:creationId xmlns:a16="http://schemas.microsoft.com/office/drawing/2014/main" id="{DD49AD4F-6143-4458-B2D0-CD400DFE5313}"/>
+              </a:ext>
+            </a:extLst>
+          </p:cNvPr>
+          <p:cNvPicPr>
+            <a:picLocks noChangeAspect="1"/>
+          </p:cNvPicPr>
+          <p:nvPr/>
+        </p:nvPicPr>
+        <p:blipFill>
+          <a:blip r:embed="rId6"/>
+          <a:stretch>
+            <a:fillRect/>
+          </a:stretch>
+        </p:blipFill>
+        <p:spPr>
+          <a:xfrm rot="20632097">
+            <a:off x="7725956" y="3275685"/>
+            <a:ext cx="3989686" cy="2992264"/>
+          </a:xfrm>
+          <a:prstGeom prst="rect">
+            <a:avLst/>
+          </a:prstGeom>
+          <a:ln>
+            <a:noFill/>
+          </a:ln>
+          <a:effectLst>
+            <a:outerShdw blurRad="190500" algn="tl" rotWithShape="0">
+              <a:srgbClr val="000000">
+                <a:alpha val="70000"/>
+              </a:srgbClr>
+            </a:outerShdw>
+          </a:effectLst>
+        </p:spPr>
+      </p:pic>
+    </p:spTree>
+    <p:extLst>
+      <p:ext uri="{BB962C8B-B14F-4D97-AF65-F5344CB8AC3E}">
+        <p14:creationId xmlns:p14="http://schemas.microsoft.com/office/powerpoint/2010/main" val="2442948889"/>
+      </p:ext>
+    </p:extLst>
+  </p:cSld>
+  <p:clrMapOvr>
+    <a:masterClrMapping/>
+  </p:clrMapOvr>
+</p:sld>
+</file>
+
+<file path=ppt/slides/slide25.xml><?xml version="1.0" encoding="utf-8"?>
+<p:sld xmlns:a="http://schemas.openxmlformats.org/drawingml/2006/main" xmlns:r="http://schemas.openxmlformats.org/officeDocument/2006/relationships" xmlns:p="http://schemas.openxmlformats.org/presentationml/2006/main">
+  <p:cSld>
+    <p:spTree>
+      <p:nvGrpSpPr>
+        <p:cNvPr id="1" name=""/>
+        <p:cNvGrpSpPr/>
+        <p:nvPr/>
+      </p:nvGrpSpPr>
+      <p:grpSpPr>
+        <a:xfrm>
+          <a:off x="0" y="0"/>
+          <a:ext cx="0" cy="0"/>
+          <a:chOff x="0" y="0"/>
+          <a:chExt cx="0" cy="0"/>
+        </a:xfrm>
+      </p:grpSpPr>
+      <p:sp>
+        <p:nvSpPr>
+          <p:cNvPr id="6" name="Заголовок 5">
+            <a:extLst>
+              <a:ext uri="{FF2B5EF4-FFF2-40B4-BE49-F238E27FC236}">
+                <a16:creationId xmlns:a16="http://schemas.microsoft.com/office/drawing/2014/main" id="{E5529602-410C-4939-BB94-AC3F768CB9B9}"/>
+              </a:ext>
+            </a:extLst>
+          </p:cNvPr>
+          <p:cNvSpPr>
+            <a:spLocks noGrp="1"/>
+          </p:cNvSpPr>
+          <p:nvPr>
+            <p:ph type="title"/>
+          </p:nvPr>
+        </p:nvSpPr>
+        <p:spPr/>
+        <p:txBody>
+          <a:bodyPr/>
+          <a:lstStyle/>
+          <a:p>
+            <a:r>
+              <a:rPr lang="ru-RU" dirty="0"/>
+              <a:t>Несколько диаграмм</a:t>
+            </a:r>
+          </a:p>
+        </p:txBody>
+      </p:sp>
+      <p:sp>
+        <p:nvSpPr>
+          <p:cNvPr id="7" name="Объект 6">
+            <a:extLst>
+              <a:ext uri="{FF2B5EF4-FFF2-40B4-BE49-F238E27FC236}">
+                <a16:creationId xmlns:a16="http://schemas.microsoft.com/office/drawing/2014/main" id="{D07C80E8-07AD-4534-BB87-5DAA000E64FD}"/>
+              </a:ext>
+            </a:extLst>
+          </p:cNvPr>
+          <p:cNvSpPr>
+            <a:spLocks noGrp="1"/>
+          </p:cNvSpPr>
+          <p:nvPr>
+            <p:ph idx="1"/>
+          </p:nvPr>
+        </p:nvSpPr>
+        <p:spPr/>
+        <p:txBody>
+          <a:bodyPr/>
+          <a:lstStyle/>
+          <a:p>
+            <a:r>
+              <a:rPr lang="ru-RU" dirty="0"/>
+              <a:t>Напомним, что </a:t>
+            </a:r>
+            <a:r>
+              <a:rPr lang="en-US" dirty="0"/>
+              <a:t>fig – </a:t>
+            </a:r>
+            <a:r>
+              <a:rPr lang="ru-RU" dirty="0"/>
+              <a:t>фигура, это, в сущности, место для размещения графических объектов, в частности – графиков.</a:t>
+            </a:r>
+          </a:p>
+          <a:p>
+            <a:r>
+              <a:rPr lang="ru-RU" dirty="0"/>
+              <a:t>Таким образом, графиков на одной фигуре может быть много.</a:t>
+            </a:r>
+          </a:p>
+          <a:p>
+            <a:r>
+              <a:rPr lang="ru-RU" dirty="0"/>
+              <a:t>Проще всего разрешить самой функции формирования графиков позаботиться об их размещении.</a:t>
+            </a:r>
+          </a:p>
+          <a:p>
+            <a:r>
+              <a:rPr lang="ru-RU" dirty="0"/>
+              <a:t>Например, мы хотим показать на разных графиках заболеваемость в Средиземноморье и в мире в целом. </a:t>
+            </a:r>
+          </a:p>
+          <a:p>
+            <a:r>
+              <a:rPr lang="ru-RU" dirty="0"/>
+              <a:t>В нашей таблице это колонки 1 и 6, соответственно</a:t>
+            </a:r>
+          </a:p>
+          <a:p>
+            <a:r>
+              <a:rPr lang="ru-RU" dirty="0"/>
+              <a:t>Чтобы сделать это, достаточно напечатать их методом </a:t>
+            </a:r>
+            <a:r>
+              <a:rPr lang="en-US" dirty="0" err="1"/>
+              <a:t>plot.bar</a:t>
+            </a:r>
+            <a:r>
+              <a:rPr lang="en-US" dirty="0"/>
+              <a:t>()</a:t>
+            </a:r>
+            <a:r>
+              <a:rPr lang="ru-RU" dirty="0"/>
+              <a:t>, но разрешить разделение на отдельные графики через параметр </a:t>
+            </a:r>
+            <a:r>
+              <a:rPr lang="en-US" dirty="0"/>
+              <a:t>Subplots=True</a:t>
+            </a:r>
+            <a:endParaRPr lang="ru-RU" dirty="0"/>
+          </a:p>
+        </p:txBody>
+      </p:sp>
+      <p:sp>
+        <p:nvSpPr>
+          <p:cNvPr id="5" name="Номер слайда 4">
+            <a:extLst>
+              <a:ext uri="{FF2B5EF4-FFF2-40B4-BE49-F238E27FC236}">
+                <a16:creationId xmlns:a16="http://schemas.microsoft.com/office/drawing/2014/main" id="{D4DA3531-D10C-4667-B588-CA3DB9535AFE}"/>
+              </a:ext>
+            </a:extLst>
+          </p:cNvPr>
+          <p:cNvSpPr>
+            <a:spLocks noGrp="1"/>
+          </p:cNvSpPr>
+          <p:nvPr>
+            <p:ph type="sldNum" sz="quarter" idx="12"/>
+          </p:nvPr>
+        </p:nvSpPr>
+        <p:spPr/>
+        <p:txBody>
+          <a:bodyPr/>
+          <a:lstStyle/>
+          <a:p>
+            <a:fld id="{4FAB73BC-B049-4115-A692-8D63A059BFB8}" type="slidenum">
+              <a:rPr lang="en-US" smtClean="0"/>
+              <a:pPr/>
+              <a:t>25</a:t>
+            </a:fld>
+            <a:endParaRPr lang="en-US" dirty="0"/>
+          </a:p>
+        </p:txBody>
+      </p:sp>
+    </p:spTree>
+    <p:extLst>
+      <p:ext uri="{BB962C8B-B14F-4D97-AF65-F5344CB8AC3E}">
+        <p14:creationId xmlns:p14="http://schemas.microsoft.com/office/powerpoint/2010/main" val="1804029239"/>
+      </p:ext>
+    </p:extLst>
+  </p:cSld>
+  <p:clrMapOvr>
+    <a:masterClrMapping/>
+  </p:clrMapOvr>
+</p:sld>
+</file>
+
+<file path=ppt/slides/slide26.xml><?xml version="1.0" encoding="utf-8"?>
+<p:sld xmlns:a="http://schemas.openxmlformats.org/drawingml/2006/main" xmlns:r="http://schemas.openxmlformats.org/officeDocument/2006/relationships" xmlns:p="http://schemas.openxmlformats.org/presentationml/2006/main">
+  <p:cSld>
+    <p:spTree>
+      <p:nvGrpSpPr>
+        <p:cNvPr id="1" name=""/>
+        <p:cNvGrpSpPr/>
+        <p:nvPr/>
+      </p:nvGrpSpPr>
+      <p:grpSpPr>
+        <a:xfrm>
+          <a:off x="0" y="0"/>
+          <a:ext cx="0" cy="0"/>
+          <a:chOff x="0" y="0"/>
+          <a:chExt cx="0" cy="0"/>
+        </a:xfrm>
+      </p:grpSpPr>
+      <p:sp>
+        <p:nvSpPr>
+          <p:cNvPr id="2" name="Заголовок 1">
+            <a:extLst>
+              <a:ext uri="{FF2B5EF4-FFF2-40B4-BE49-F238E27FC236}">
+                <a16:creationId xmlns:a16="http://schemas.microsoft.com/office/drawing/2014/main" id="{5A0AACF9-43AA-4603-9A74-0FD13861F159}"/>
+              </a:ext>
+            </a:extLst>
+          </p:cNvPr>
+          <p:cNvSpPr>
+            <a:spLocks noGrp="1"/>
+          </p:cNvSpPr>
+          <p:nvPr>
+            <p:ph type="title"/>
+          </p:nvPr>
+        </p:nvSpPr>
+        <p:spPr/>
+        <p:txBody>
+          <a:bodyPr/>
+          <a:lstStyle/>
+          <a:p>
+            <a:endParaRPr lang="ru-RU"/>
+          </a:p>
+        </p:txBody>
+      </p:sp>
+      <p:pic>
+        <p:nvPicPr>
+          <p:cNvPr id="6" name="Объект 5">
+            <a:extLst>
+              <a:ext uri="{FF2B5EF4-FFF2-40B4-BE49-F238E27FC236}">
+                <a16:creationId xmlns:a16="http://schemas.microsoft.com/office/drawing/2014/main" id="{2323DD54-4702-4200-945C-91ABE3E8D285}"/>
+              </a:ext>
+            </a:extLst>
+          </p:cNvPr>
+          <p:cNvPicPr>
+            <a:picLocks noGrp="1" noChangeAspect="1"/>
+          </p:cNvPicPr>
+          <p:nvPr>
+            <p:ph sz="half" idx="1"/>
+          </p:nvPr>
+        </p:nvPicPr>
+        <p:blipFill>
+          <a:blip r:embed="rId2"/>
+          <a:stretch>
+            <a:fillRect/>
+          </a:stretch>
+        </p:blipFill>
+        <p:spPr>
+          <a:xfrm>
+            <a:off x="1057757" y="2743200"/>
+            <a:ext cx="4748297" cy="696085"/>
+          </a:xfrm>
+          <a:prstGeom prst="rect">
+            <a:avLst/>
+          </a:prstGeom>
+        </p:spPr>
+      </p:pic>
+      <p:pic>
+        <p:nvPicPr>
+          <p:cNvPr id="7" name="Объект 6">
+            <a:extLst>
+              <a:ext uri="{FF2B5EF4-FFF2-40B4-BE49-F238E27FC236}">
+                <a16:creationId xmlns:a16="http://schemas.microsoft.com/office/drawing/2014/main" id="{82925B65-A585-4A8C-A8C5-3114FAC33828}"/>
+              </a:ext>
+            </a:extLst>
+          </p:cNvPr>
+          <p:cNvPicPr>
+            <a:picLocks noGrp="1" noChangeAspect="1"/>
+          </p:cNvPicPr>
+          <p:nvPr>
+            <p:ph sz="half" idx="2"/>
+          </p:nvPr>
+        </p:nvPicPr>
+        <p:blipFill>
+          <a:blip r:embed="rId3"/>
+          <a:stretch>
+            <a:fillRect/>
+          </a:stretch>
+        </p:blipFill>
+        <p:spPr>
+          <a:xfrm>
+            <a:off x="6470650" y="1172170"/>
+            <a:ext cx="5287963" cy="3965972"/>
+          </a:xfrm>
+          <a:prstGeom prst="rect">
+            <a:avLst/>
+          </a:prstGeom>
+          <a:ln>
+            <a:noFill/>
+          </a:ln>
+          <a:effectLst>
+            <a:outerShdw blurRad="190500" algn="tl" rotWithShape="0">
+              <a:srgbClr val="000000">
+                <a:alpha val="70000"/>
+              </a:srgbClr>
+            </a:outerShdw>
+          </a:effectLst>
+        </p:spPr>
+      </p:pic>
+      <p:sp>
+        <p:nvSpPr>
+          <p:cNvPr id="5" name="Номер слайда 4">
+            <a:extLst>
+              <a:ext uri="{FF2B5EF4-FFF2-40B4-BE49-F238E27FC236}">
+                <a16:creationId xmlns:a16="http://schemas.microsoft.com/office/drawing/2014/main" id="{DB7E5BCE-CC4E-4D28-A596-AC0A8BBA4B18}"/>
+              </a:ext>
+            </a:extLst>
+          </p:cNvPr>
+          <p:cNvSpPr>
+            <a:spLocks noGrp="1"/>
+          </p:cNvSpPr>
+          <p:nvPr>
+            <p:ph type="sldNum" sz="quarter" idx="12"/>
+          </p:nvPr>
+        </p:nvSpPr>
+        <p:spPr/>
+        <p:txBody>
+          <a:bodyPr/>
+          <a:lstStyle/>
+          <a:p>
+            <a:fld id="{4FAB73BC-B049-4115-A692-8D63A059BFB8}" type="slidenum">
+              <a:rPr lang="en-US" smtClean="0"/>
+              <a:pPr/>
+              <a:t>26</a:t>
+            </a:fld>
+            <a:endParaRPr lang="en-US" dirty="0"/>
+          </a:p>
+        </p:txBody>
+      </p:sp>
+      <p:sp>
+        <p:nvSpPr>
+          <p:cNvPr id="8" name="TextBox 7">
+            <a:extLst>
+              <a:ext uri="{FF2B5EF4-FFF2-40B4-BE49-F238E27FC236}">
+                <a16:creationId xmlns:a16="http://schemas.microsoft.com/office/drawing/2014/main" id="{1EE797AC-4748-4073-A8C0-B8248932EB48}"/>
+              </a:ext>
+            </a:extLst>
+          </p:cNvPr>
+          <p:cNvSpPr txBox="1"/>
+          <p:nvPr/>
+        </p:nvSpPr>
+        <p:spPr>
+          <a:xfrm rot="20728605">
+            <a:off x="1701353" y="5147080"/>
+            <a:ext cx="4572000" cy="646331"/>
+          </a:xfrm>
+          <a:prstGeom prst="rect">
+            <a:avLst/>
+          </a:prstGeom>
+        </p:spPr>
+        <p:style>
+          <a:lnRef idx="0">
+            <a:schemeClr val="accent2"/>
+          </a:lnRef>
+          <a:fillRef idx="3">
+            <a:schemeClr val="accent2"/>
+          </a:fillRef>
+          <a:effectRef idx="3">
+            <a:schemeClr val="accent2"/>
+          </a:effectRef>
+          <a:fontRef idx="minor">
+            <a:schemeClr val="lt1"/>
+          </a:fontRef>
+        </p:style>
+        <p:txBody>
+          <a:bodyPr wrap="square" rtlCol="0">
+            <a:spAutoFit/>
+          </a:bodyPr>
+          <a:lstStyle/>
+          <a:p>
+            <a:r>
+              <a:rPr lang="ru-RU" dirty="0"/>
+              <a:t>Вопрос: почему мировые данные выведены на верхнем графике</a:t>
+            </a:r>
+            <a:r>
+              <a:rPr lang="en-US" dirty="0"/>
+              <a:t>?</a:t>
+            </a:r>
+            <a:endParaRPr lang="ru-RU" dirty="0"/>
+          </a:p>
+        </p:txBody>
+      </p:sp>
+    </p:spTree>
+    <p:extLst>
+      <p:ext uri="{BB962C8B-B14F-4D97-AF65-F5344CB8AC3E}">
+        <p14:creationId xmlns:p14="http://schemas.microsoft.com/office/powerpoint/2010/main" val="811288987"/>
+      </p:ext>
+    </p:extLst>
+  </p:cSld>
+  <p:clrMapOvr>
+    <a:masterClrMapping/>
+  </p:clrMapOvr>
+</p:sld>
+</file>
+
+<file path=ppt/slides/slide27.xml><?xml version="1.0" encoding="utf-8"?>
+<p:sld xmlns:a="http://schemas.openxmlformats.org/drawingml/2006/main" xmlns:r="http://schemas.openxmlformats.org/officeDocument/2006/relationships" xmlns:p="http://schemas.openxmlformats.org/presentationml/2006/main">
+  <p:cSld>
+    <p:spTree>
+      <p:nvGrpSpPr>
+        <p:cNvPr id="1" name=""/>
+        <p:cNvGrpSpPr/>
+        <p:nvPr/>
+      </p:nvGrpSpPr>
+      <p:grpSpPr>
+        <a:xfrm>
+          <a:off x="0" y="0"/>
+          <a:ext cx="0" cy="0"/>
+          <a:chOff x="0" y="0"/>
+          <a:chExt cx="0" cy="0"/>
+        </a:xfrm>
+      </p:grpSpPr>
+      <p:sp>
+        <p:nvSpPr>
+          <p:cNvPr id="6" name="Заголовок 5">
+            <a:extLst>
+              <a:ext uri="{FF2B5EF4-FFF2-40B4-BE49-F238E27FC236}">
+                <a16:creationId xmlns:a16="http://schemas.microsoft.com/office/drawing/2014/main" id="{3DFFE1EA-895B-4069-BC22-5CF926EA113D}"/>
+              </a:ext>
+            </a:extLst>
+          </p:cNvPr>
+          <p:cNvSpPr>
+            <a:spLocks noGrp="1"/>
+          </p:cNvSpPr>
+          <p:nvPr>
+            <p:ph type="title"/>
+          </p:nvPr>
+        </p:nvSpPr>
+        <p:spPr/>
+        <p:txBody>
+          <a:bodyPr/>
+          <a:lstStyle/>
+          <a:p>
+            <a:r>
+              <a:rPr lang="ru-RU" dirty="0"/>
+              <a:t>Что выведет на экран следующая команда</a:t>
+            </a:r>
+          </a:p>
+        </p:txBody>
+      </p:sp>
+      <p:sp>
+        <p:nvSpPr>
+          <p:cNvPr id="7" name="Текст 6">
+            <a:extLst>
+              <a:ext uri="{FF2B5EF4-FFF2-40B4-BE49-F238E27FC236}">
+                <a16:creationId xmlns:a16="http://schemas.microsoft.com/office/drawing/2014/main" id="{9690D0F3-F927-458C-B3C6-CB72B9835749}"/>
+              </a:ext>
+            </a:extLst>
+          </p:cNvPr>
+          <p:cNvSpPr>
+            <a:spLocks noGrp="1"/>
+          </p:cNvSpPr>
+          <p:nvPr>
+            <p:ph type="body" idx="1"/>
+          </p:nvPr>
+        </p:nvSpPr>
+        <p:spPr/>
+        <p:txBody>
+          <a:bodyPr/>
+          <a:lstStyle/>
+          <a:p>
+            <a:r>
+              <a:rPr lang="en-US" dirty="0"/>
+              <a:t>fig6 = </a:t>
+            </a:r>
+            <a:r>
+              <a:rPr lang="en-US" dirty="0" err="1"/>
+              <a:t>pivot.plot.bar</a:t>
+            </a:r>
+            <a:r>
+              <a:rPr lang="en-US" dirty="0"/>
+              <a:t>(y=range(0,7),subplots=True)</a:t>
+            </a:r>
+          </a:p>
+          <a:p>
+            <a:r>
+              <a:rPr lang="en-US" dirty="0" err="1"/>
+              <a:t>plt.show</a:t>
+            </a:r>
+            <a:r>
+              <a:rPr lang="en-US" dirty="0"/>
+              <a:t>()</a:t>
+            </a:r>
+            <a:endParaRPr lang="ru-RU" dirty="0"/>
+          </a:p>
+          <a:p>
+            <a:endParaRPr lang="ru-RU" dirty="0"/>
+          </a:p>
+          <a:p>
+            <a:r>
+              <a:rPr lang="ru-RU" dirty="0"/>
+              <a:t>(не запускайте файл </a:t>
+            </a:r>
+            <a:r>
+              <a:rPr lang="en-US"/>
+              <a:t>np6_1)</a:t>
+            </a:r>
+            <a:endParaRPr lang="ru-RU"/>
+          </a:p>
+        </p:txBody>
+      </p:sp>
+      <p:sp>
+        <p:nvSpPr>
+          <p:cNvPr id="5" name="Номер слайда 4">
+            <a:extLst>
+              <a:ext uri="{FF2B5EF4-FFF2-40B4-BE49-F238E27FC236}">
+                <a16:creationId xmlns:a16="http://schemas.microsoft.com/office/drawing/2014/main" id="{568E9447-F03E-4B45-A0B6-D5A2860A8D9D}"/>
+              </a:ext>
+            </a:extLst>
+          </p:cNvPr>
+          <p:cNvSpPr>
+            <a:spLocks noGrp="1"/>
+          </p:cNvSpPr>
+          <p:nvPr>
+            <p:ph type="sldNum" sz="quarter" idx="12"/>
+          </p:nvPr>
+        </p:nvSpPr>
+        <p:spPr/>
+        <p:txBody>
+          <a:bodyPr/>
+          <a:lstStyle/>
+          <a:p>
+            <a:fld id="{4FAB73BC-B049-4115-A692-8D63A059BFB8}" type="slidenum">
+              <a:rPr lang="en-US" smtClean="0"/>
+              <a:pPr/>
+              <a:t>27</a:t>
+            </a:fld>
+            <a:endParaRPr lang="en-US" dirty="0"/>
+          </a:p>
+        </p:txBody>
+      </p:sp>
+    </p:spTree>
+    <p:extLst>
+      <p:ext uri="{BB962C8B-B14F-4D97-AF65-F5344CB8AC3E}">
+        <p14:creationId xmlns:p14="http://schemas.microsoft.com/office/powerpoint/2010/main" val="3123790275"/>
       </p:ext>
     </p:extLst>
   </p:cSld>

</xml_diff>